<commit_message>
Finished task 2 and initialize task 3
</commit_message>
<xml_diff>
--- a/Task 2/Muhammad Cikal Merdeka_Mini_Project_3_Task_2.pptx
+++ b/Task 2/Muhammad Cikal Merdeka_Mini_Project_3_Task_2.pptx
@@ -5,29 +5,30 @@
     <p:sldMasterId id="2147483659" r:id="rId1"/>
   </p:sldMasterIdLst>
   <p:notesMasterIdLst>
-    <p:notesMasterId r:id="rId7"/>
+    <p:notesMasterId r:id="rId8"/>
   </p:notesMasterIdLst>
   <p:sldIdLst>
     <p:sldId id="257" r:id="rId2"/>
-    <p:sldId id="261" r:id="rId3"/>
-    <p:sldId id="262" r:id="rId4"/>
-    <p:sldId id="256" r:id="rId5"/>
-    <p:sldId id="260" r:id="rId6"/>
+    <p:sldId id="265" r:id="rId3"/>
+    <p:sldId id="261" r:id="rId4"/>
+    <p:sldId id="264" r:id="rId5"/>
+    <p:sldId id="262" r:id="rId6"/>
+    <p:sldId id="263" r:id="rId7"/>
   </p:sldIdLst>
   <p:sldSz cx="9144000" cy="5143500" type="screen16x9"/>
   <p:notesSz cx="6858000" cy="9144000"/>
   <p:embeddedFontLst>
     <p:embeddedFont>
       <p:font typeface="Dosis" pitchFamily="2" charset="0"/>
-      <p:regular r:id="rId8"/>
-      <p:bold r:id="rId9"/>
+      <p:regular r:id="rId9"/>
+      <p:bold r:id="rId10"/>
     </p:embeddedFont>
     <p:embeddedFont>
       <p:font typeface="Roboto" panose="02000000000000000000" pitchFamily="2" charset="0"/>
-      <p:regular r:id="rId10"/>
-      <p:bold r:id="rId11"/>
-      <p:italic r:id="rId12"/>
-      <p:boldItalic r:id="rId13"/>
+      <p:regular r:id="rId11"/>
+      <p:bold r:id="rId12"/>
+      <p:italic r:id="rId13"/>
+      <p:boldItalic r:id="rId14"/>
     </p:embeddedFont>
   </p:embeddedFontLst>
   <p:defaultTextStyle>
@@ -922,7 +923,7 @@
     </p:spTree>
     <p:extLst>
       <p:ext uri="{BB962C8B-B14F-4D97-AF65-F5344CB8AC3E}">
-        <p14:creationId xmlns:p14="http://schemas.microsoft.com/office/powerpoint/2010/main" val="4097796535"/>
+        <p14:creationId xmlns:p14="http://schemas.microsoft.com/office/powerpoint/2010/main" val="758102958"/>
       </p:ext>
     </p:extLst>
   </p:cSld>
@@ -1031,7 +1032,7 @@
     </p:spTree>
     <p:extLst>
       <p:ext uri="{BB962C8B-B14F-4D97-AF65-F5344CB8AC3E}">
-        <p14:creationId xmlns:p14="http://schemas.microsoft.com/office/powerpoint/2010/main" val="2673731871"/>
+        <p14:creationId xmlns:p14="http://schemas.microsoft.com/office/powerpoint/2010/main" val="4097796535"/>
       </p:ext>
     </p:extLst>
   </p:cSld>
@@ -1138,6 +1139,11 @@
         </p:txBody>
       </p:sp>
     </p:spTree>
+    <p:extLst>
+      <p:ext uri="{BB962C8B-B14F-4D97-AF65-F5344CB8AC3E}">
+        <p14:creationId xmlns:p14="http://schemas.microsoft.com/office/powerpoint/2010/main" val="6997890"/>
+      </p:ext>
+    </p:extLst>
   </p:cSld>
   <p:clrMapOvr>
     <a:masterClrMapping/>
@@ -1244,7 +1250,116 @@
     </p:spTree>
     <p:extLst>
       <p:ext uri="{BB962C8B-B14F-4D97-AF65-F5344CB8AC3E}">
-        <p14:creationId xmlns:p14="http://schemas.microsoft.com/office/powerpoint/2010/main" val="2624657685"/>
+        <p14:creationId xmlns:p14="http://schemas.microsoft.com/office/powerpoint/2010/main" val="2673731871"/>
+      </p:ext>
+    </p:extLst>
+  </p:cSld>
+  <p:clrMapOvr>
+    <a:masterClrMapping/>
+  </p:clrMapOvr>
+</p:notes>
+</file>
+
+<file path=ppt/notesSlides/notesSlide6.xml><?xml version="1.0" encoding="utf-8"?>
+<p:notes xmlns:a="http://schemas.openxmlformats.org/drawingml/2006/main" xmlns:r="http://schemas.openxmlformats.org/officeDocument/2006/relationships" xmlns:p="http://schemas.openxmlformats.org/presentationml/2006/main" showMasterSp="0" showMasterPhAnim="0">
+  <p:cSld>
+    <p:spTree>
+      <p:nvGrpSpPr>
+        <p:cNvPr id="1" name="Shape 50"/>
+        <p:cNvGrpSpPr/>
+        <p:nvPr/>
+      </p:nvGrpSpPr>
+      <p:grpSpPr>
+        <a:xfrm>
+          <a:off x="0" y="0"/>
+          <a:ext cx="0" cy="0"/>
+          <a:chOff x="0" y="0"/>
+          <a:chExt cx="0" cy="0"/>
+        </a:xfrm>
+      </p:grpSpPr>
+      <p:sp>
+        <p:nvSpPr>
+          <p:cNvPr id="51" name="Google Shape;51;g109baabb656_0_0:notes"/>
+          <p:cNvSpPr>
+            <a:spLocks noGrp="1" noRot="1" noChangeAspect="1"/>
+          </p:cNvSpPr>
+          <p:nvPr>
+            <p:ph type="sldImg" idx="2"/>
+          </p:nvPr>
+        </p:nvSpPr>
+        <p:spPr>
+          <a:xfrm>
+            <a:off x="381000" y="685800"/>
+            <a:ext cx="6096000" cy="3429000"/>
+          </a:xfrm>
+          <a:custGeom>
+            <a:avLst/>
+            <a:gdLst/>
+            <a:ahLst/>
+            <a:cxnLst/>
+            <a:rect l="l" t="t" r="r" b="b"/>
+            <a:pathLst>
+              <a:path w="120000" h="120000" extrusionOk="0">
+                <a:moveTo>
+                  <a:pt x="0" y="0"/>
+                </a:moveTo>
+                <a:lnTo>
+                  <a:pt x="120000" y="0"/>
+                </a:lnTo>
+                <a:lnTo>
+                  <a:pt x="120000" y="120000"/>
+                </a:lnTo>
+                <a:lnTo>
+                  <a:pt x="0" y="120000"/>
+                </a:lnTo>
+                <a:close/>
+              </a:path>
+            </a:pathLst>
+          </a:custGeom>
+        </p:spPr>
+      </p:sp>
+      <p:sp>
+        <p:nvSpPr>
+          <p:cNvPr id="52" name="Google Shape;52;g109baabb656_0_0:notes"/>
+          <p:cNvSpPr txBox="1">
+            <a:spLocks noGrp="1"/>
+          </p:cNvSpPr>
+          <p:nvPr>
+            <p:ph type="body" idx="1"/>
+          </p:nvPr>
+        </p:nvSpPr>
+        <p:spPr>
+          <a:xfrm>
+            <a:off x="685800" y="4343400"/>
+            <a:ext cx="5486400" cy="4114800"/>
+          </a:xfrm>
+          <a:prstGeom prst="rect">
+            <a:avLst/>
+          </a:prstGeom>
+        </p:spPr>
+        <p:txBody>
+          <a:bodyPr spcFirstLastPara="1" wrap="square" lIns="91425" tIns="91425" rIns="91425" bIns="91425" anchor="t" anchorCtr="0">
+            <a:noAutofit/>
+          </a:bodyPr>
+          <a:lstStyle/>
+          <a:p>
+            <a:pPr marL="0" lvl="0" indent="0" algn="l" rtl="0">
+              <a:spcBef>
+                <a:spcPts val="0"/>
+              </a:spcBef>
+              <a:spcAft>
+                <a:spcPts val="0"/>
+              </a:spcAft>
+              <a:buNone/>
+            </a:pPr>
+            <a:endParaRPr/>
+          </a:p>
+        </p:txBody>
+      </p:sp>
+    </p:spTree>
+    <p:extLst>
+      <p:ext uri="{BB962C8B-B14F-4D97-AF65-F5344CB8AC3E}">
+        <p14:creationId xmlns:p14="http://schemas.microsoft.com/office/powerpoint/2010/main" val="4006148521"/>
       </p:ext>
     </p:extLst>
   </p:cSld>
@@ -7258,6 +7373,695 @@
                   <a:schemeClr val="dk1"/>
                 </a:solidFill>
               </a:rPr>
+              <a:t>Drop Unnecessary/Unrelated Columns</a:t>
+            </a:r>
+            <a:endParaRPr lang="en-US" sz="1300" dirty="0">
+              <a:solidFill>
+                <a:schemeClr val="tx1"/>
+              </a:solidFill>
+              <a:latin typeface="Dosis" pitchFamily="2" charset="0"/>
+            </a:endParaRPr>
+          </a:p>
+          <a:p>
+            <a:pPr marL="114300" indent="0">
+              <a:buNone/>
+            </a:pPr>
+            <a:endParaRPr lang="en-US" sz="1300" b="0" dirty="0">
+              <a:solidFill>
+                <a:schemeClr val="tx1"/>
+              </a:solidFill>
+              <a:effectLst/>
+              <a:latin typeface="Dosis" pitchFamily="2" charset="0"/>
+            </a:endParaRPr>
+          </a:p>
+          <a:p>
+            <a:pPr marL="114300" indent="0">
+              <a:buNone/>
+            </a:pPr>
+            <a:endParaRPr lang="en-US" sz="1300" b="0" dirty="0">
+              <a:solidFill>
+                <a:schemeClr val="tx1"/>
+              </a:solidFill>
+              <a:effectLst/>
+              <a:latin typeface="Dosis" pitchFamily="2" charset="0"/>
+            </a:endParaRPr>
+          </a:p>
+        </p:txBody>
+      </p:sp>
+      <p:sp>
+        <p:nvSpPr>
+          <p:cNvPr id="9" name="TextBox 8">
+            <a:extLst>
+              <a:ext uri="{FF2B5EF4-FFF2-40B4-BE49-F238E27FC236}">
+                <a16:creationId xmlns:a16="http://schemas.microsoft.com/office/drawing/2014/main" id="{B4EE2CE7-96C3-2B90-60C4-819168952D3B}"/>
+              </a:ext>
+            </a:extLst>
+          </p:cNvPr>
+          <p:cNvSpPr txBox="1"/>
+          <p:nvPr/>
+        </p:nvSpPr>
+        <p:spPr>
+          <a:xfrm>
+            <a:off x="293410" y="1046019"/>
+            <a:ext cx="8573499" cy="2062103"/>
+          </a:xfrm>
+          <a:prstGeom prst="rect">
+            <a:avLst/>
+          </a:prstGeom>
+          <a:noFill/>
+        </p:spPr>
+        <p:txBody>
+          <a:bodyPr wrap="square" rtlCol="0">
+            <a:spAutoFit/>
+          </a:bodyPr>
+          <a:lstStyle/>
+          <a:p>
+            <a:pPr marL="285750" indent="-285750">
+              <a:buFont typeface="Arial" panose="020B0604020202020204" pitchFamily="34" charset="0"/>
+              <a:buChar char="•"/>
+            </a:pPr>
+            <a:r>
+              <a:rPr lang="en-US" sz="1600" dirty="0">
+                <a:latin typeface="Dosis" pitchFamily="2" charset="0"/>
+              </a:rPr>
+              <a:t>Some columns (not all) in the dataset that have lost their importance as an individual column will be dropped since their information already stored in the new engineered column (as explained in Task 1).</a:t>
+            </a:r>
+          </a:p>
+          <a:p>
+            <a:pPr marL="285750" indent="-285750">
+              <a:buFont typeface="Arial" panose="020B0604020202020204" pitchFamily="34" charset="0"/>
+              <a:buChar char="•"/>
+            </a:pPr>
+            <a:endParaRPr lang="en-US" sz="1600" dirty="0">
+              <a:latin typeface="Dosis" pitchFamily="2" charset="0"/>
+            </a:endParaRPr>
+          </a:p>
+          <a:p>
+            <a:pPr marL="285750" indent="-285750">
+              <a:buFont typeface="Arial" panose="020B0604020202020204" pitchFamily="34" charset="0"/>
+              <a:buChar char="•"/>
+            </a:pPr>
+            <a:r>
+              <a:rPr lang="en-US" sz="1600" dirty="0">
+                <a:latin typeface="Dosis" pitchFamily="2" charset="0"/>
+              </a:rPr>
+              <a:t>These columns also doesn’t store related information to our model and keeping them will just increase the dimension.</a:t>
+            </a:r>
+          </a:p>
+          <a:p>
+            <a:pPr marL="285750" indent="-285750">
+              <a:buFont typeface="Arial" panose="020B0604020202020204" pitchFamily="34" charset="0"/>
+              <a:buChar char="•"/>
+            </a:pPr>
+            <a:endParaRPr lang="en-US" sz="1600" dirty="0">
+              <a:latin typeface="Dosis" pitchFamily="2" charset="0"/>
+            </a:endParaRPr>
+          </a:p>
+          <a:p>
+            <a:pPr marL="285750" indent="-285750">
+              <a:buFont typeface="Arial" panose="020B0604020202020204" pitchFamily="34" charset="0"/>
+              <a:buChar char="•"/>
+            </a:pPr>
+            <a:r>
+              <a:rPr lang="en-US" sz="1600" dirty="0">
+                <a:latin typeface="Dosis" pitchFamily="2" charset="0"/>
+              </a:rPr>
+              <a:t>Columns that will be dropped are :</a:t>
+            </a:r>
+            <a:endParaRPr lang="en-ID" sz="1600" dirty="0">
+              <a:latin typeface="Dosis" pitchFamily="2" charset="0"/>
+            </a:endParaRPr>
+          </a:p>
+          <a:p>
+            <a:pPr marL="285750" lvl="1" indent="-285750">
+              <a:buFont typeface="Arial" panose="020B0604020202020204" pitchFamily="34" charset="0"/>
+              <a:buChar char="•"/>
+            </a:pPr>
+            <a:endParaRPr lang="en-ID" sz="1600" dirty="0">
+              <a:latin typeface="Dosis" pitchFamily="2" charset="0"/>
+            </a:endParaRPr>
+          </a:p>
+        </p:txBody>
+      </p:sp>
+      <p:sp>
+        <p:nvSpPr>
+          <p:cNvPr id="3" name="Google Shape;115;p27">
+            <a:extLst>
+              <a:ext uri="{FF2B5EF4-FFF2-40B4-BE49-F238E27FC236}">
+                <a16:creationId xmlns:a16="http://schemas.microsoft.com/office/drawing/2014/main" id="{32973375-13E8-AF6F-F542-41340D401E8F}"/>
+              </a:ext>
+            </a:extLst>
+          </p:cNvPr>
+          <p:cNvSpPr txBox="1"/>
+          <p:nvPr/>
+        </p:nvSpPr>
+        <p:spPr>
+          <a:xfrm>
+            <a:off x="4656000" y="4772700"/>
+            <a:ext cx="4488000" cy="353913"/>
+          </a:xfrm>
+          <a:prstGeom prst="rect">
+            <a:avLst/>
+          </a:prstGeom>
+          <a:noFill/>
+          <a:ln>
+            <a:noFill/>
+          </a:ln>
+        </p:spPr>
+        <p:txBody>
+          <a:bodyPr spcFirstLastPara="1" wrap="square" lIns="91425" tIns="91425" rIns="91425" bIns="91425" anchor="t" anchorCtr="0">
+            <a:spAutoFit/>
+          </a:bodyPr>
+          <a:lstStyle/>
+          <a:p>
+            <a:pPr marL="0" lvl="0" indent="0" algn="r" rtl="0">
+              <a:lnSpc>
+                <a:spcPct val="100000"/>
+              </a:lnSpc>
+              <a:spcBef>
+                <a:spcPts val="0"/>
+              </a:spcBef>
+              <a:spcAft>
+                <a:spcPts val="0"/>
+              </a:spcAft>
+              <a:buNone/>
+            </a:pPr>
+            <a:r>
+              <a:rPr lang="en-US" sz="1100" dirty="0">
+                <a:solidFill>
+                  <a:srgbClr val="000000"/>
+                </a:solidFill>
+              </a:rPr>
+              <a:t>For more details, you can view the </a:t>
+            </a:r>
+            <a:r>
+              <a:rPr lang="en-US" sz="1100" dirty="0" err="1">
+                <a:solidFill>
+                  <a:srgbClr val="000000"/>
+                </a:solidFill>
+              </a:rPr>
+              <a:t>Jupyter</a:t>
+            </a:r>
+            <a:r>
+              <a:rPr lang="en-US" sz="1100" dirty="0">
+                <a:solidFill>
+                  <a:srgbClr val="000000"/>
+                </a:solidFill>
+              </a:rPr>
+              <a:t> notebook </a:t>
+            </a:r>
+            <a:r>
+              <a:rPr lang="en-US" sz="1100" dirty="0">
+                <a:solidFill>
+                  <a:srgbClr val="000000"/>
+                </a:solidFill>
+                <a:hlinkClick r:id="rId3"/>
+              </a:rPr>
+              <a:t>here</a:t>
+            </a:r>
+            <a:r>
+              <a:rPr lang="en-US" sz="1100" dirty="0">
+                <a:solidFill>
+                  <a:srgbClr val="000000"/>
+                </a:solidFill>
+              </a:rPr>
+              <a:t>.</a:t>
+            </a:r>
+          </a:p>
+        </p:txBody>
+      </p:sp>
+      <p:sp>
+        <p:nvSpPr>
+          <p:cNvPr id="5" name="TextBox 4">
+            <a:extLst>
+              <a:ext uri="{FF2B5EF4-FFF2-40B4-BE49-F238E27FC236}">
+                <a16:creationId xmlns:a16="http://schemas.microsoft.com/office/drawing/2014/main" id="{B3915A29-95EB-07B7-5C41-7CE18042938E}"/>
+              </a:ext>
+            </a:extLst>
+          </p:cNvPr>
+          <p:cNvSpPr txBox="1"/>
+          <p:nvPr/>
+        </p:nvSpPr>
+        <p:spPr>
+          <a:xfrm>
+            <a:off x="623455" y="2833834"/>
+            <a:ext cx="3041072" cy="1169551"/>
+          </a:xfrm>
+          <a:prstGeom prst="rect">
+            <a:avLst/>
+          </a:prstGeom>
+          <a:noFill/>
+        </p:spPr>
+        <p:txBody>
+          <a:bodyPr wrap="square">
+            <a:spAutoFit/>
+          </a:bodyPr>
+          <a:lstStyle/>
+          <a:p>
+            <a:pPr marL="285750" lvl="6" indent="-285750">
+              <a:buFont typeface="Wingdings" panose="05000000000000000000" pitchFamily="2" charset="2"/>
+              <a:buChar char="q"/>
+            </a:pPr>
+            <a:r>
+              <a:rPr lang="en-ID" sz="1400" dirty="0">
+                <a:latin typeface="Dosis" pitchFamily="2" charset="0"/>
+              </a:rPr>
+              <a:t>Unnamed: 0</a:t>
+            </a:r>
+          </a:p>
+          <a:p>
+            <a:pPr marL="285750" lvl="6" indent="-285750">
+              <a:buFont typeface="Wingdings" panose="05000000000000000000" pitchFamily="2" charset="2"/>
+              <a:buChar char="q"/>
+            </a:pPr>
+            <a:r>
+              <a:rPr lang="en-ID" sz="1400" dirty="0">
+                <a:latin typeface="Dosis" pitchFamily="2" charset="0"/>
+              </a:rPr>
+              <a:t>ID</a:t>
+            </a:r>
+          </a:p>
+          <a:p>
+            <a:pPr marL="285750" lvl="6" indent="-285750">
+              <a:buFont typeface="Wingdings" panose="05000000000000000000" pitchFamily="2" charset="2"/>
+              <a:buChar char="q"/>
+            </a:pPr>
+            <a:r>
+              <a:rPr lang="en-ID" sz="1400" dirty="0" err="1">
+                <a:latin typeface="Dosis" pitchFamily="2" charset="0"/>
+              </a:rPr>
+              <a:t>Year_Birth</a:t>
+            </a:r>
+            <a:endParaRPr lang="en-ID" sz="1400" dirty="0">
+              <a:latin typeface="Dosis" pitchFamily="2" charset="0"/>
+            </a:endParaRPr>
+          </a:p>
+          <a:p>
+            <a:pPr marL="285750" lvl="6" indent="-285750">
+              <a:buFont typeface="Wingdings" panose="05000000000000000000" pitchFamily="2" charset="2"/>
+              <a:buChar char="q"/>
+            </a:pPr>
+            <a:r>
+              <a:rPr lang="en-ID" sz="1400" dirty="0" err="1">
+                <a:latin typeface="Dosis" pitchFamily="2" charset="0"/>
+              </a:rPr>
+              <a:t>Marital_Status</a:t>
+            </a:r>
+            <a:endParaRPr lang="en-ID" sz="1400" dirty="0">
+              <a:latin typeface="Dosis" pitchFamily="2" charset="0"/>
+            </a:endParaRPr>
+          </a:p>
+          <a:p>
+            <a:pPr marL="285750" lvl="6" indent="-285750">
+              <a:buFont typeface="Wingdings" panose="05000000000000000000" pitchFamily="2" charset="2"/>
+              <a:buChar char="q"/>
+            </a:pPr>
+            <a:r>
+              <a:rPr lang="en-ID" sz="1400" dirty="0" err="1">
+                <a:latin typeface="Dosis" pitchFamily="2" charset="0"/>
+              </a:rPr>
+              <a:t>Dt_Customer</a:t>
+            </a:r>
+            <a:endParaRPr lang="en-ID" sz="1400" dirty="0">
+              <a:latin typeface="Dosis" pitchFamily="2" charset="0"/>
+            </a:endParaRPr>
+          </a:p>
+        </p:txBody>
+      </p:sp>
+    </p:spTree>
+    <p:extLst>
+      <p:ext uri="{BB962C8B-B14F-4D97-AF65-F5344CB8AC3E}">
+        <p14:creationId xmlns:p14="http://schemas.microsoft.com/office/powerpoint/2010/main" val="3491603412"/>
+      </p:ext>
+    </p:extLst>
+  </p:cSld>
+  <p:clrMapOvr>
+    <a:masterClrMapping/>
+  </p:clrMapOvr>
+</p:sld>
+</file>
+
+<file path=ppt/slides/slide3.xml><?xml version="1.0" encoding="utf-8"?>
+<p:sld xmlns:a="http://schemas.openxmlformats.org/drawingml/2006/main" xmlns:r="http://schemas.openxmlformats.org/officeDocument/2006/relationships" xmlns:p="http://schemas.openxmlformats.org/presentationml/2006/main">
+  <p:cSld>
+    <p:spTree>
+      <p:nvGrpSpPr>
+        <p:cNvPr id="1" name="Shape 53"/>
+        <p:cNvGrpSpPr/>
+        <p:nvPr/>
+      </p:nvGrpSpPr>
+      <p:grpSpPr>
+        <a:xfrm>
+          <a:off x="0" y="0"/>
+          <a:ext cx="0" cy="0"/>
+          <a:chOff x="0" y="0"/>
+          <a:chExt cx="0" cy="0"/>
+        </a:xfrm>
+      </p:grpSpPr>
+      <p:sp>
+        <p:nvSpPr>
+          <p:cNvPr id="54" name="Google Shape;54;p13"/>
+          <p:cNvSpPr txBox="1">
+            <a:spLocks noGrp="1"/>
+          </p:cNvSpPr>
+          <p:nvPr>
+            <p:ph type="title"/>
+          </p:nvPr>
+        </p:nvSpPr>
+        <p:spPr>
+          <a:xfrm>
+            <a:off x="0" y="37175"/>
+            <a:ext cx="8180700" cy="523200"/>
+          </a:xfrm>
+          <a:prstGeom prst="rect">
+            <a:avLst/>
+          </a:prstGeom>
+        </p:spPr>
+        <p:txBody>
+          <a:bodyPr spcFirstLastPara="1" wrap="square" lIns="91425" tIns="91425" rIns="91425" bIns="91425" anchor="t" anchorCtr="0">
+            <a:noAutofit/>
+          </a:bodyPr>
+          <a:lstStyle/>
+          <a:p>
+            <a:pPr marL="0" lvl="0" indent="0" algn="ctr" rtl="0">
+              <a:spcBef>
+                <a:spcPts val="0"/>
+              </a:spcBef>
+              <a:spcAft>
+                <a:spcPts val="0"/>
+              </a:spcAft>
+              <a:buSzPts val="990"/>
+              <a:buNone/>
+            </a:pPr>
+            <a:r>
+              <a:rPr lang="en" sz="1798" b="1" dirty="0">
+                <a:latin typeface="Roboto"/>
+                <a:ea typeface="Roboto"/>
+                <a:cs typeface="Roboto"/>
+                <a:sym typeface="Roboto"/>
+              </a:rPr>
+              <a:t>Data Cleaning &amp; Preprocessing</a:t>
+            </a:r>
+            <a:endParaRPr sz="1798" dirty="0">
+              <a:solidFill>
+                <a:schemeClr val="lt1"/>
+              </a:solidFill>
+              <a:latin typeface="Roboto"/>
+              <a:ea typeface="Roboto"/>
+              <a:cs typeface="Roboto"/>
+              <a:sym typeface="Roboto"/>
+            </a:endParaRPr>
+          </a:p>
+        </p:txBody>
+      </p:sp>
+      <p:sp>
+        <p:nvSpPr>
+          <p:cNvPr id="2" name="Google Shape;55;p13">
+            <a:extLst>
+              <a:ext uri="{FF2B5EF4-FFF2-40B4-BE49-F238E27FC236}">
+                <a16:creationId xmlns:a16="http://schemas.microsoft.com/office/drawing/2014/main" id="{F20F9562-6705-B4D0-B0B7-A44492A7FB4A}"/>
+              </a:ext>
+            </a:extLst>
+          </p:cNvPr>
+          <p:cNvSpPr txBox="1">
+            <a:spLocks/>
+          </p:cNvSpPr>
+          <p:nvPr/>
+        </p:nvSpPr>
+        <p:spPr>
+          <a:xfrm>
+            <a:off x="177315" y="603429"/>
+            <a:ext cx="8779649" cy="442590"/>
+          </a:xfrm>
+          <a:prstGeom prst="rect">
+            <a:avLst/>
+          </a:prstGeom>
+          <a:noFill/>
+          <a:ln>
+            <a:noFill/>
+          </a:ln>
+        </p:spPr>
+        <p:txBody>
+          <a:bodyPr spcFirstLastPara="1" wrap="square" lIns="91425" tIns="91425" rIns="91425" bIns="91425" anchor="t" anchorCtr="0">
+            <a:noAutofit/>
+          </a:bodyPr>
+          <a:lstStyle>
+            <a:defPPr marR="0" lvl="0" algn="l" rtl="0">
+              <a:lnSpc>
+                <a:spcPct val="100000"/>
+              </a:lnSpc>
+              <a:spcBef>
+                <a:spcPts val="0"/>
+              </a:spcBef>
+              <a:spcAft>
+                <a:spcPts val="0"/>
+              </a:spcAft>
+            </a:defPPr>
+            <a:lvl1pPr marL="457200" marR="0" lvl="0" indent="-342900" algn="l" rtl="0">
+              <a:lnSpc>
+                <a:spcPct val="115000"/>
+              </a:lnSpc>
+              <a:spcBef>
+                <a:spcPts val="0"/>
+              </a:spcBef>
+              <a:spcAft>
+                <a:spcPts val="0"/>
+              </a:spcAft>
+              <a:buClr>
+                <a:schemeClr val="dk2"/>
+              </a:buClr>
+              <a:buSzPts val="1800"/>
+              <a:buFont typeface="Arial"/>
+              <a:buChar char="●"/>
+              <a:defRPr sz="1800" b="0" i="0" u="none" strike="noStrike" cap="none">
+                <a:solidFill>
+                  <a:schemeClr val="dk2"/>
+                </a:solidFill>
+                <a:latin typeface="Arial"/>
+                <a:ea typeface="Arial"/>
+                <a:cs typeface="Arial"/>
+                <a:sym typeface="Arial"/>
+              </a:defRPr>
+            </a:lvl1pPr>
+            <a:lvl2pPr marL="914400" marR="0" lvl="1" indent="-317500" algn="l" rtl="0">
+              <a:lnSpc>
+                <a:spcPct val="115000"/>
+              </a:lnSpc>
+              <a:spcBef>
+                <a:spcPts val="0"/>
+              </a:spcBef>
+              <a:spcAft>
+                <a:spcPts val="0"/>
+              </a:spcAft>
+              <a:buClr>
+                <a:schemeClr val="dk2"/>
+              </a:buClr>
+              <a:buSzPts val="1400"/>
+              <a:buFont typeface="Arial"/>
+              <a:buChar char="○"/>
+              <a:defRPr sz="1400" b="0" i="0" u="none" strike="noStrike" cap="none">
+                <a:solidFill>
+                  <a:schemeClr val="dk2"/>
+                </a:solidFill>
+                <a:latin typeface="Arial"/>
+                <a:ea typeface="Arial"/>
+                <a:cs typeface="Arial"/>
+                <a:sym typeface="Arial"/>
+              </a:defRPr>
+            </a:lvl2pPr>
+            <a:lvl3pPr marL="1371600" marR="0" lvl="2" indent="-317500" algn="l" rtl="0">
+              <a:lnSpc>
+                <a:spcPct val="115000"/>
+              </a:lnSpc>
+              <a:spcBef>
+                <a:spcPts val="0"/>
+              </a:spcBef>
+              <a:spcAft>
+                <a:spcPts val="0"/>
+              </a:spcAft>
+              <a:buClr>
+                <a:schemeClr val="dk2"/>
+              </a:buClr>
+              <a:buSzPts val="1400"/>
+              <a:buFont typeface="Arial"/>
+              <a:buChar char="■"/>
+              <a:defRPr sz="1400" b="0" i="0" u="none" strike="noStrike" cap="none">
+                <a:solidFill>
+                  <a:schemeClr val="dk2"/>
+                </a:solidFill>
+                <a:latin typeface="Arial"/>
+                <a:ea typeface="Arial"/>
+                <a:cs typeface="Arial"/>
+                <a:sym typeface="Arial"/>
+              </a:defRPr>
+            </a:lvl3pPr>
+            <a:lvl4pPr marL="1828800" marR="0" lvl="3" indent="-317500" algn="l" rtl="0">
+              <a:lnSpc>
+                <a:spcPct val="115000"/>
+              </a:lnSpc>
+              <a:spcBef>
+                <a:spcPts val="0"/>
+              </a:spcBef>
+              <a:spcAft>
+                <a:spcPts val="0"/>
+              </a:spcAft>
+              <a:buClr>
+                <a:schemeClr val="dk2"/>
+              </a:buClr>
+              <a:buSzPts val="1400"/>
+              <a:buFont typeface="Arial"/>
+              <a:buChar char="●"/>
+              <a:defRPr sz="1400" b="0" i="0" u="none" strike="noStrike" cap="none">
+                <a:solidFill>
+                  <a:schemeClr val="dk2"/>
+                </a:solidFill>
+                <a:latin typeface="Arial"/>
+                <a:ea typeface="Arial"/>
+                <a:cs typeface="Arial"/>
+                <a:sym typeface="Arial"/>
+              </a:defRPr>
+            </a:lvl4pPr>
+            <a:lvl5pPr marL="2286000" marR="0" lvl="4" indent="-317500" algn="l" rtl="0">
+              <a:lnSpc>
+                <a:spcPct val="115000"/>
+              </a:lnSpc>
+              <a:spcBef>
+                <a:spcPts val="0"/>
+              </a:spcBef>
+              <a:spcAft>
+                <a:spcPts val="0"/>
+              </a:spcAft>
+              <a:buClr>
+                <a:schemeClr val="dk2"/>
+              </a:buClr>
+              <a:buSzPts val="1400"/>
+              <a:buFont typeface="Arial"/>
+              <a:buChar char="○"/>
+              <a:defRPr sz="1400" b="0" i="0" u="none" strike="noStrike" cap="none">
+                <a:solidFill>
+                  <a:schemeClr val="dk2"/>
+                </a:solidFill>
+                <a:latin typeface="Arial"/>
+                <a:ea typeface="Arial"/>
+                <a:cs typeface="Arial"/>
+                <a:sym typeface="Arial"/>
+              </a:defRPr>
+            </a:lvl5pPr>
+            <a:lvl6pPr marL="2743200" marR="0" lvl="5" indent="-317500" algn="l" rtl="0">
+              <a:lnSpc>
+                <a:spcPct val="115000"/>
+              </a:lnSpc>
+              <a:spcBef>
+                <a:spcPts val="0"/>
+              </a:spcBef>
+              <a:spcAft>
+                <a:spcPts val="0"/>
+              </a:spcAft>
+              <a:buClr>
+                <a:schemeClr val="dk2"/>
+              </a:buClr>
+              <a:buSzPts val="1400"/>
+              <a:buFont typeface="Arial"/>
+              <a:buChar char="■"/>
+              <a:defRPr sz="1400" b="0" i="0" u="none" strike="noStrike" cap="none">
+                <a:solidFill>
+                  <a:schemeClr val="dk2"/>
+                </a:solidFill>
+                <a:latin typeface="Arial"/>
+                <a:ea typeface="Arial"/>
+                <a:cs typeface="Arial"/>
+                <a:sym typeface="Arial"/>
+              </a:defRPr>
+            </a:lvl6pPr>
+            <a:lvl7pPr marL="3200400" marR="0" lvl="6" indent="-317500" algn="l" rtl="0">
+              <a:lnSpc>
+                <a:spcPct val="115000"/>
+              </a:lnSpc>
+              <a:spcBef>
+                <a:spcPts val="0"/>
+              </a:spcBef>
+              <a:spcAft>
+                <a:spcPts val="0"/>
+              </a:spcAft>
+              <a:buClr>
+                <a:schemeClr val="dk2"/>
+              </a:buClr>
+              <a:buSzPts val="1400"/>
+              <a:buFont typeface="Arial"/>
+              <a:buChar char="●"/>
+              <a:defRPr sz="1400" b="0" i="0" u="none" strike="noStrike" cap="none">
+                <a:solidFill>
+                  <a:schemeClr val="dk2"/>
+                </a:solidFill>
+                <a:latin typeface="Arial"/>
+                <a:ea typeface="Arial"/>
+                <a:cs typeface="Arial"/>
+                <a:sym typeface="Arial"/>
+              </a:defRPr>
+            </a:lvl7pPr>
+            <a:lvl8pPr marL="3657600" marR="0" lvl="7" indent="-317500" algn="l" rtl="0">
+              <a:lnSpc>
+                <a:spcPct val="115000"/>
+              </a:lnSpc>
+              <a:spcBef>
+                <a:spcPts val="0"/>
+              </a:spcBef>
+              <a:spcAft>
+                <a:spcPts val="0"/>
+              </a:spcAft>
+              <a:buClr>
+                <a:schemeClr val="dk2"/>
+              </a:buClr>
+              <a:buSzPts val="1400"/>
+              <a:buFont typeface="Arial"/>
+              <a:buChar char="○"/>
+              <a:defRPr sz="1400" b="0" i="0" u="none" strike="noStrike" cap="none">
+                <a:solidFill>
+                  <a:schemeClr val="dk2"/>
+                </a:solidFill>
+                <a:latin typeface="Arial"/>
+                <a:ea typeface="Arial"/>
+                <a:cs typeface="Arial"/>
+                <a:sym typeface="Arial"/>
+              </a:defRPr>
+            </a:lvl8pPr>
+            <a:lvl9pPr marL="4114800" marR="0" lvl="8" indent="-317500" algn="l" rtl="0">
+              <a:lnSpc>
+                <a:spcPct val="115000"/>
+              </a:lnSpc>
+              <a:spcBef>
+                <a:spcPts val="0"/>
+              </a:spcBef>
+              <a:spcAft>
+                <a:spcPts val="0"/>
+              </a:spcAft>
+              <a:buClr>
+                <a:schemeClr val="dk2"/>
+              </a:buClr>
+              <a:buSzPts val="1400"/>
+              <a:buFont typeface="Arial"/>
+              <a:buChar char="■"/>
+              <a:defRPr sz="1400" b="0" i="0" u="none" strike="noStrike" cap="none">
+                <a:solidFill>
+                  <a:schemeClr val="dk2"/>
+                </a:solidFill>
+                <a:latin typeface="Arial"/>
+                <a:ea typeface="Arial"/>
+                <a:cs typeface="Arial"/>
+                <a:sym typeface="Arial"/>
+              </a:defRPr>
+            </a:lvl9pPr>
+          </a:lstStyle>
+          <a:p>
+            <a:pPr marL="114300" indent="0">
+              <a:buNone/>
+            </a:pPr>
+            <a:r>
+              <a:rPr lang="en-US" sz="1400" b="1" dirty="0">
+                <a:solidFill>
+                  <a:schemeClr val="dk1"/>
+                </a:solidFill>
+              </a:rPr>
               <a:t>Identifying Missing and Duplicated Values</a:t>
             </a:r>
           </a:p>
@@ -7526,6 +8330,93 @@
           </a:fontRef>
         </p:style>
       </p:cxnSp>
+      <p:sp>
+        <p:nvSpPr>
+          <p:cNvPr id="3" name="Google Shape;115;p27">
+            <a:extLst>
+              <a:ext uri="{FF2B5EF4-FFF2-40B4-BE49-F238E27FC236}">
+                <a16:creationId xmlns:a16="http://schemas.microsoft.com/office/drawing/2014/main" id="{32973375-13E8-AF6F-F542-41340D401E8F}"/>
+              </a:ext>
+            </a:extLst>
+          </p:cNvPr>
+          <p:cNvSpPr txBox="1"/>
+          <p:nvPr/>
+        </p:nvSpPr>
+        <p:spPr>
+          <a:xfrm>
+            <a:off x="4656000" y="4772700"/>
+            <a:ext cx="4488000" cy="353913"/>
+          </a:xfrm>
+          <a:prstGeom prst="rect">
+            <a:avLst/>
+          </a:prstGeom>
+          <a:noFill/>
+          <a:ln>
+            <a:noFill/>
+          </a:ln>
+        </p:spPr>
+        <p:txBody>
+          <a:bodyPr spcFirstLastPara="1" wrap="square" lIns="91425" tIns="91425" rIns="91425" bIns="91425" anchor="t" anchorCtr="0">
+            <a:spAutoFit/>
+          </a:bodyPr>
+          <a:lstStyle/>
+          <a:p>
+            <a:pPr marL="0" lvl="0" indent="0" algn="r" rtl="0">
+              <a:lnSpc>
+                <a:spcPct val="100000"/>
+              </a:lnSpc>
+              <a:spcBef>
+                <a:spcPts val="0"/>
+              </a:spcBef>
+              <a:spcAft>
+                <a:spcPts val="0"/>
+              </a:spcAft>
+              <a:buNone/>
+            </a:pPr>
+            <a:r>
+              <a:rPr lang="en-US" sz="1100" dirty="0">
+                <a:solidFill>
+                  <a:srgbClr val="000000"/>
+                </a:solidFill>
+              </a:rPr>
+              <a:t>For more details, you can view the </a:t>
+            </a:r>
+            <a:r>
+              <a:rPr lang="en-US" sz="1100" dirty="0" err="1">
+                <a:solidFill>
+                  <a:srgbClr val="000000"/>
+                </a:solidFill>
+              </a:rPr>
+              <a:t>Jupyter</a:t>
+            </a:r>
+            <a:r>
+              <a:rPr lang="en-US" sz="1100" dirty="0">
+                <a:solidFill>
+                  <a:srgbClr val="000000"/>
+                </a:solidFill>
+              </a:rPr>
+              <a:t> notebook </a:t>
+            </a:r>
+            <a:r>
+              <a:rPr lang="en-US" sz="1100" dirty="0">
+                <a:solidFill>
+                  <a:srgbClr val="000000"/>
+                </a:solidFill>
+                <a:hlinkClick r:id="rId5"/>
+              </a:rPr>
+              <a:t>here</a:t>
+            </a:r>
+            <a:r>
+              <a:rPr lang="en-US" sz="1100" dirty="0">
+                <a:solidFill>
+                  <a:srgbClr val="000000"/>
+                </a:solidFill>
+              </a:rPr>
+              <a:t>.</a:t>
+            </a:r>
+          </a:p>
+        </p:txBody>
+      </p:sp>
     </p:spTree>
     <p:extLst>
       <p:ext uri="{BB962C8B-B14F-4D97-AF65-F5344CB8AC3E}">
@@ -7539,7 +8430,7 @@
 </p:sld>
 </file>
 
-<file path=ppt/slides/slide3.xml><?xml version="1.0" encoding="utf-8"?>
+<file path=ppt/slides/slide4.xml><?xml version="1.0" encoding="utf-8"?>
 <p:sld xmlns:a="http://schemas.openxmlformats.org/drawingml/2006/main" xmlns:r="http://schemas.openxmlformats.org/officeDocument/2006/relationships" xmlns:p="http://schemas.openxmlformats.org/presentationml/2006/main">
   <p:cSld>
     <p:spTree>
@@ -7900,43 +8791,8 @@
                   <a:schemeClr val="dk1"/>
                 </a:solidFill>
               </a:rPr>
-              <a:t>Feature Encoding</a:t>
+              <a:t>Outliers Handling</a:t>
             </a:r>
-          </a:p>
-          <a:p>
-            <a:pPr marL="114300" indent="0">
-              <a:buNone/>
-            </a:pPr>
-            <a:endParaRPr lang="en-US" sz="1300" dirty="0">
-              <a:solidFill>
-                <a:schemeClr val="tx1"/>
-              </a:solidFill>
-              <a:latin typeface="Dosis" pitchFamily="2" charset="0"/>
-            </a:endParaRPr>
-          </a:p>
-          <a:p>
-            <a:pPr marL="114300" indent="0">
-              <a:buNone/>
-            </a:pPr>
-            <a:endParaRPr lang="en-US" sz="1300" b="0" dirty="0">
-              <a:solidFill>
-                <a:schemeClr val="tx1"/>
-              </a:solidFill>
-              <a:effectLst/>
-              <a:latin typeface="Dosis" pitchFamily="2" charset="0"/>
-            </a:endParaRPr>
-          </a:p>
-          <a:p>
-            <a:pPr marL="114300" indent="0">
-              <a:buNone/>
-            </a:pPr>
-            <a:endParaRPr lang="en-US" sz="1300" b="0" dirty="0">
-              <a:solidFill>
-                <a:schemeClr val="tx1"/>
-              </a:solidFill>
-              <a:effectLst/>
-              <a:latin typeface="Dosis" pitchFamily="2" charset="0"/>
-            </a:endParaRPr>
           </a:p>
         </p:txBody>
       </p:sp>
@@ -7954,8 +8810,340 @@
         </p:nvSpPr>
         <p:spPr>
           <a:xfrm>
-            <a:off x="3660064" y="2077289"/>
-            <a:ext cx="5235303" cy="1323439"/>
+            <a:off x="293410" y="1046019"/>
+            <a:ext cx="8663554" cy="523220"/>
+          </a:xfrm>
+          <a:prstGeom prst="rect">
+            <a:avLst/>
+          </a:prstGeom>
+          <a:noFill/>
+        </p:spPr>
+        <p:txBody>
+          <a:bodyPr wrap="square" rtlCol="0">
+            <a:spAutoFit/>
+          </a:bodyPr>
+          <a:lstStyle/>
+          <a:p>
+            <a:r>
+              <a:rPr lang="en-US" dirty="0">
+                <a:latin typeface="Dosis" pitchFamily="2" charset="0"/>
+              </a:rPr>
+              <a:t>Handling outliers with z-score method to columns that have really extreme values (not applied to all columns). Columns that will be handled are : </a:t>
+            </a:r>
+            <a:r>
+              <a:rPr lang="en-US" dirty="0" err="1">
+                <a:latin typeface="Dosis" pitchFamily="2" charset="0"/>
+              </a:rPr>
+              <a:t>Year_Birth</a:t>
+            </a:r>
+            <a:r>
+              <a:rPr lang="en-US" dirty="0">
+                <a:latin typeface="Dosis" pitchFamily="2" charset="0"/>
+              </a:rPr>
+              <a:t>, Income, </a:t>
+            </a:r>
+            <a:r>
+              <a:rPr lang="en-US" dirty="0" err="1">
+                <a:latin typeface="Dosis" pitchFamily="2" charset="0"/>
+              </a:rPr>
+              <a:t>MntMeatProducts</a:t>
+            </a:r>
+            <a:r>
+              <a:rPr lang="en-US" dirty="0">
+                <a:latin typeface="Dosis" pitchFamily="2" charset="0"/>
+              </a:rPr>
+              <a:t>, </a:t>
+            </a:r>
+            <a:r>
+              <a:rPr lang="en-US" dirty="0" err="1">
+                <a:latin typeface="Dosis" pitchFamily="2" charset="0"/>
+              </a:rPr>
+              <a:t>MntSweetProducts</a:t>
+            </a:r>
+            <a:r>
+              <a:rPr lang="en-US" dirty="0">
+                <a:latin typeface="Dosis" pitchFamily="2" charset="0"/>
+              </a:rPr>
+              <a:t>, </a:t>
+            </a:r>
+            <a:r>
+              <a:rPr lang="en-US" dirty="0" err="1">
+                <a:latin typeface="Dosis" pitchFamily="2" charset="0"/>
+              </a:rPr>
+              <a:t>NumWebPurchases</a:t>
+            </a:r>
+            <a:r>
+              <a:rPr lang="en-US" dirty="0">
+                <a:latin typeface="Dosis" pitchFamily="2" charset="0"/>
+              </a:rPr>
+              <a:t>, </a:t>
+            </a:r>
+            <a:r>
+              <a:rPr lang="en-US" dirty="0" err="1">
+                <a:latin typeface="Dosis" pitchFamily="2" charset="0"/>
+              </a:rPr>
+              <a:t>NumCatalogPurchases</a:t>
+            </a:r>
+            <a:endParaRPr lang="en-ID" dirty="0">
+              <a:latin typeface="Dosis" pitchFamily="2" charset="0"/>
+            </a:endParaRPr>
+          </a:p>
+        </p:txBody>
+      </p:sp>
+      <p:pic>
+        <p:nvPicPr>
+          <p:cNvPr id="4" name="Picture 3">
+            <a:extLst>
+              <a:ext uri="{FF2B5EF4-FFF2-40B4-BE49-F238E27FC236}">
+                <a16:creationId xmlns:a16="http://schemas.microsoft.com/office/drawing/2014/main" id="{73E19EC4-0FF4-4F42-A506-0AA6E08681B0}"/>
+              </a:ext>
+            </a:extLst>
+          </p:cNvPr>
+          <p:cNvPicPr>
+            <a:picLocks noChangeAspect="1"/>
+          </p:cNvPicPr>
+          <p:nvPr/>
+        </p:nvPicPr>
+        <p:blipFill>
+          <a:blip r:embed="rId3"/>
+          <a:stretch>
+            <a:fillRect/>
+          </a:stretch>
+        </p:blipFill>
+        <p:spPr>
+          <a:xfrm>
+            <a:off x="382271" y="1680076"/>
+            <a:ext cx="4768417" cy="3293706"/>
+          </a:xfrm>
+          <a:prstGeom prst="rect">
+            <a:avLst/>
+          </a:prstGeom>
+        </p:spPr>
+      </p:pic>
+      <p:sp>
+        <p:nvSpPr>
+          <p:cNvPr id="5" name="Rectangle 4">
+            <a:extLst>
+              <a:ext uri="{FF2B5EF4-FFF2-40B4-BE49-F238E27FC236}">
+                <a16:creationId xmlns:a16="http://schemas.microsoft.com/office/drawing/2014/main" id="{888BAE19-5800-9D84-0E21-881A2B66FB5A}"/>
+              </a:ext>
+            </a:extLst>
+          </p:cNvPr>
+          <p:cNvSpPr/>
+          <p:nvPr/>
+        </p:nvSpPr>
+        <p:spPr>
+          <a:xfrm>
+            <a:off x="1212273" y="2739947"/>
+            <a:ext cx="768928" cy="1125471"/>
+          </a:xfrm>
+          <a:prstGeom prst="rect">
+            <a:avLst/>
+          </a:prstGeom>
+          <a:noFill/>
+          <a:ln w="12700">
+            <a:solidFill>
+              <a:srgbClr val="FF0000"/>
+            </a:solidFill>
+          </a:ln>
+        </p:spPr>
+        <p:style>
+          <a:lnRef idx="2">
+            <a:schemeClr val="accent1">
+              <a:shade val="15000"/>
+            </a:schemeClr>
+          </a:lnRef>
+          <a:fillRef idx="1">
+            <a:schemeClr val="accent1"/>
+          </a:fillRef>
+          <a:effectRef idx="0">
+            <a:schemeClr val="accent1"/>
+          </a:effectRef>
+          <a:fontRef idx="minor">
+            <a:schemeClr val="lt1"/>
+          </a:fontRef>
+        </p:style>
+        <p:txBody>
+          <a:bodyPr rtlCol="0" anchor="ctr"/>
+          <a:lstStyle/>
+          <a:p>
+            <a:pPr algn="ctr"/>
+            <a:endParaRPr lang="en-ID"/>
+          </a:p>
+        </p:txBody>
+      </p:sp>
+      <p:sp>
+        <p:nvSpPr>
+          <p:cNvPr id="6" name="Rectangle 5">
+            <a:extLst>
+              <a:ext uri="{FF2B5EF4-FFF2-40B4-BE49-F238E27FC236}">
+                <a16:creationId xmlns:a16="http://schemas.microsoft.com/office/drawing/2014/main" id="{662A376A-7A7B-AFFF-025E-BB6F2C7BBCC3}"/>
+              </a:ext>
+            </a:extLst>
+          </p:cNvPr>
+          <p:cNvSpPr/>
+          <p:nvPr/>
+        </p:nvSpPr>
+        <p:spPr>
+          <a:xfrm>
+            <a:off x="534672" y="1680076"/>
+            <a:ext cx="1446530" cy="1059872"/>
+          </a:xfrm>
+          <a:prstGeom prst="rect">
+            <a:avLst/>
+          </a:prstGeom>
+          <a:noFill/>
+          <a:ln w="12700">
+            <a:solidFill>
+              <a:srgbClr val="FF0000"/>
+            </a:solidFill>
+          </a:ln>
+        </p:spPr>
+        <p:style>
+          <a:lnRef idx="2">
+            <a:schemeClr val="accent1">
+              <a:shade val="15000"/>
+            </a:schemeClr>
+          </a:lnRef>
+          <a:fillRef idx="1">
+            <a:schemeClr val="accent1"/>
+          </a:fillRef>
+          <a:effectRef idx="0">
+            <a:schemeClr val="accent1"/>
+          </a:effectRef>
+          <a:fontRef idx="minor">
+            <a:schemeClr val="lt1"/>
+          </a:fontRef>
+        </p:style>
+        <p:txBody>
+          <a:bodyPr rtlCol="0" anchor="ctr"/>
+          <a:lstStyle/>
+          <a:p>
+            <a:pPr algn="ctr"/>
+            <a:endParaRPr lang="en-ID"/>
+          </a:p>
+        </p:txBody>
+      </p:sp>
+      <p:sp>
+        <p:nvSpPr>
+          <p:cNvPr id="7" name="Rectangle 6">
+            <a:extLst>
+              <a:ext uri="{FF2B5EF4-FFF2-40B4-BE49-F238E27FC236}">
+                <a16:creationId xmlns:a16="http://schemas.microsoft.com/office/drawing/2014/main" id="{13DFDD1D-F4F0-2CD7-CC7B-8628C4DB5BC4}"/>
+              </a:ext>
+            </a:extLst>
+          </p:cNvPr>
+          <p:cNvSpPr/>
+          <p:nvPr/>
+        </p:nvSpPr>
+        <p:spPr>
+          <a:xfrm>
+            <a:off x="2766479" y="2739947"/>
+            <a:ext cx="768928" cy="1125471"/>
+          </a:xfrm>
+          <a:prstGeom prst="rect">
+            <a:avLst/>
+          </a:prstGeom>
+          <a:noFill/>
+          <a:ln w="12700">
+            <a:solidFill>
+              <a:srgbClr val="FF0000"/>
+            </a:solidFill>
+          </a:ln>
+        </p:spPr>
+        <p:style>
+          <a:lnRef idx="2">
+            <a:schemeClr val="accent1">
+              <a:shade val="15000"/>
+            </a:schemeClr>
+          </a:lnRef>
+          <a:fillRef idx="1">
+            <a:schemeClr val="accent1"/>
+          </a:fillRef>
+          <a:effectRef idx="0">
+            <a:schemeClr val="accent1"/>
+          </a:effectRef>
+          <a:fontRef idx="minor">
+            <a:schemeClr val="lt1"/>
+          </a:fontRef>
+        </p:style>
+        <p:txBody>
+          <a:bodyPr rtlCol="0" anchor="ctr"/>
+          <a:lstStyle/>
+          <a:p>
+            <a:pPr algn="ctr"/>
+            <a:endParaRPr lang="en-ID"/>
+          </a:p>
+        </p:txBody>
+      </p:sp>
+      <p:sp>
+        <p:nvSpPr>
+          <p:cNvPr id="10" name="Rectangle 9">
+            <a:extLst>
+              <a:ext uri="{FF2B5EF4-FFF2-40B4-BE49-F238E27FC236}">
+                <a16:creationId xmlns:a16="http://schemas.microsoft.com/office/drawing/2014/main" id="{B0CD03B8-F01D-5A96-F990-2B3172B26714}"/>
+              </a:ext>
+            </a:extLst>
+          </p:cNvPr>
+          <p:cNvSpPr/>
+          <p:nvPr/>
+        </p:nvSpPr>
+        <p:spPr>
+          <a:xfrm>
+            <a:off x="534671" y="3865418"/>
+            <a:ext cx="1446530" cy="1059872"/>
+          </a:xfrm>
+          <a:prstGeom prst="rect">
+            <a:avLst/>
+          </a:prstGeom>
+          <a:noFill/>
+          <a:ln w="12700">
+            <a:solidFill>
+              <a:srgbClr val="FF0000"/>
+            </a:solidFill>
+          </a:ln>
+        </p:spPr>
+        <p:style>
+          <a:lnRef idx="2">
+            <a:schemeClr val="accent1">
+              <a:shade val="15000"/>
+            </a:schemeClr>
+          </a:lnRef>
+          <a:fillRef idx="1">
+            <a:schemeClr val="accent1"/>
+          </a:fillRef>
+          <a:effectRef idx="0">
+            <a:schemeClr val="accent1"/>
+          </a:effectRef>
+          <a:fontRef idx="minor">
+            <a:schemeClr val="lt1"/>
+          </a:fontRef>
+        </p:style>
+        <p:txBody>
+          <a:bodyPr rtlCol="0" anchor="ctr"/>
+          <a:lstStyle/>
+          <a:p>
+            <a:pPr algn="ctr"/>
+            <a:endParaRPr lang="en-ID"/>
+          </a:p>
+        </p:txBody>
+      </p:sp>
+      <p:sp>
+        <p:nvSpPr>
+          <p:cNvPr id="11" name="TextBox 10">
+            <a:extLst>
+              <a:ext uri="{FF2B5EF4-FFF2-40B4-BE49-F238E27FC236}">
+                <a16:creationId xmlns:a16="http://schemas.microsoft.com/office/drawing/2014/main" id="{3FE23C26-19E9-D759-6D29-E9A7380F4DF3}"/>
+              </a:ext>
+            </a:extLst>
+          </p:cNvPr>
+          <p:cNvSpPr txBox="1"/>
+          <p:nvPr/>
+        </p:nvSpPr>
+        <p:spPr>
+          <a:xfrm>
+            <a:off x="5303089" y="2717907"/>
+            <a:ext cx="3378045" cy="584775"/>
           </a:xfrm>
           <a:prstGeom prst="rect">
             <a:avLst/>
@@ -7976,19 +9164,7 @@
               <a:rPr lang="en-US" sz="1600" dirty="0">
                 <a:latin typeface="Dosis" pitchFamily="2" charset="0"/>
               </a:rPr>
-              <a:t>Income column have a small percentage missing values, we will handle that by </a:t>
-            </a:r>
-            <a:r>
-              <a:rPr lang="en-US" sz="1600" b="1" dirty="0">
-                <a:latin typeface="Dosis" pitchFamily="2" charset="0"/>
-              </a:rPr>
-              <a:t>imputation with median values</a:t>
-            </a:r>
-            <a:r>
-              <a:rPr lang="en-US" sz="1600" dirty="0">
-                <a:latin typeface="Dosis" pitchFamily="2" charset="0"/>
-              </a:rPr>
-              <a:t> considering the positive skewed distribution of the values.</a:t>
+              <a:t>Rows before removing outliers: 2240</a:t>
             </a:r>
           </a:p>
           <a:p>
@@ -7996,430 +9172,24 @@
               <a:buFont typeface="Arial" panose="020B0604020202020204" pitchFamily="34" charset="0"/>
               <a:buChar char="•"/>
             </a:pPr>
-            <a:endParaRPr lang="en-US" sz="1600" dirty="0">
+            <a:r>
+              <a:rPr lang="en-US" sz="1600" dirty="0">
+                <a:latin typeface="Dosis" pitchFamily="2" charset="0"/>
+              </a:rPr>
+              <a:t>Rows after removing outliers: 1861</a:t>
+            </a:r>
+            <a:endParaRPr lang="en-ID" sz="1600" dirty="0">
               <a:latin typeface="Dosis" pitchFamily="2" charset="0"/>
             </a:endParaRPr>
-          </a:p>
-          <a:p>
-            <a:pPr marL="285750" indent="-285750">
-              <a:buFont typeface="Arial" panose="020B0604020202020204" pitchFamily="34" charset="0"/>
-              <a:buChar char="•"/>
-            </a:pPr>
-            <a:r>
-              <a:rPr lang="en-ID" sz="1600" dirty="0">
-                <a:latin typeface="Dosis" pitchFamily="2" charset="0"/>
-              </a:rPr>
-              <a:t>No duplicated values in this dataset.</a:t>
-            </a:r>
           </a:p>
         </p:txBody>
       </p:sp>
     </p:spTree>
     <p:extLst>
       <p:ext uri="{BB962C8B-B14F-4D97-AF65-F5344CB8AC3E}">
-        <p14:creationId xmlns:p14="http://schemas.microsoft.com/office/powerpoint/2010/main" val="2268143110"/>
+        <p14:creationId xmlns:p14="http://schemas.microsoft.com/office/powerpoint/2010/main" val="957458278"/>
       </p:ext>
     </p:extLst>
-  </p:cSld>
-  <p:clrMapOvr>
-    <a:masterClrMapping/>
-  </p:clrMapOvr>
-</p:sld>
-</file>
-
-<file path=ppt/slides/slide4.xml><?xml version="1.0" encoding="utf-8"?>
-<p:sld xmlns:a="http://schemas.openxmlformats.org/drawingml/2006/main" xmlns:r="http://schemas.openxmlformats.org/officeDocument/2006/relationships" xmlns:p="http://schemas.openxmlformats.org/presentationml/2006/main">
-  <p:cSld>
-    <p:spTree>
-      <p:nvGrpSpPr>
-        <p:cNvPr id="1" name="Shape 53"/>
-        <p:cNvGrpSpPr/>
-        <p:nvPr/>
-      </p:nvGrpSpPr>
-      <p:grpSpPr>
-        <a:xfrm>
-          <a:off x="0" y="0"/>
-          <a:ext cx="0" cy="0"/>
-          <a:chOff x="0" y="0"/>
-          <a:chExt cx="0" cy="0"/>
-        </a:xfrm>
-      </p:grpSpPr>
-      <p:sp>
-        <p:nvSpPr>
-          <p:cNvPr id="54" name="Google Shape;54;p13"/>
-          <p:cNvSpPr txBox="1">
-            <a:spLocks noGrp="1"/>
-          </p:cNvSpPr>
-          <p:nvPr>
-            <p:ph type="title"/>
-          </p:nvPr>
-        </p:nvSpPr>
-        <p:spPr>
-          <a:xfrm>
-            <a:off x="0" y="37175"/>
-            <a:ext cx="8180700" cy="523200"/>
-          </a:xfrm>
-          <a:prstGeom prst="rect">
-            <a:avLst/>
-          </a:prstGeom>
-        </p:spPr>
-        <p:txBody>
-          <a:bodyPr spcFirstLastPara="1" wrap="square" lIns="91425" tIns="91425" rIns="91425" bIns="91425" anchor="t" anchorCtr="0">
-            <a:noAutofit/>
-          </a:bodyPr>
-          <a:lstStyle/>
-          <a:p>
-            <a:pPr marL="0" lvl="0" indent="0" algn="ctr" rtl="0">
-              <a:spcBef>
-                <a:spcPts val="0"/>
-              </a:spcBef>
-              <a:spcAft>
-                <a:spcPts val="0"/>
-              </a:spcAft>
-              <a:buSzPts val="990"/>
-              <a:buNone/>
-            </a:pPr>
-            <a:r>
-              <a:rPr lang="en" sz="1798" b="1" dirty="0">
-                <a:latin typeface="Roboto"/>
-                <a:ea typeface="Roboto"/>
-                <a:cs typeface="Roboto"/>
-                <a:sym typeface="Roboto"/>
-              </a:rPr>
-              <a:t>Data Cleaning &amp; Preprocessing</a:t>
-            </a:r>
-            <a:endParaRPr sz="1798" dirty="0">
-              <a:solidFill>
-                <a:schemeClr val="lt1"/>
-              </a:solidFill>
-              <a:latin typeface="Roboto"/>
-              <a:ea typeface="Roboto"/>
-              <a:cs typeface="Roboto"/>
-              <a:sym typeface="Roboto"/>
-            </a:endParaRPr>
-          </a:p>
-        </p:txBody>
-      </p:sp>
-      <p:sp>
-        <p:nvSpPr>
-          <p:cNvPr id="55" name="Google Shape;55;p13"/>
-          <p:cNvSpPr txBox="1">
-            <a:spLocks noGrp="1"/>
-          </p:cNvSpPr>
-          <p:nvPr>
-            <p:ph type="body" idx="1"/>
-          </p:nvPr>
-        </p:nvSpPr>
-        <p:spPr>
-          <a:xfrm>
-            <a:off x="311700" y="823775"/>
-            <a:ext cx="8520600" cy="4098600"/>
-          </a:xfrm>
-          <a:prstGeom prst="rect">
-            <a:avLst/>
-          </a:prstGeom>
-        </p:spPr>
-        <p:txBody>
-          <a:bodyPr spcFirstLastPara="1" wrap="square" lIns="91425" tIns="91425" rIns="91425" bIns="91425" anchor="t" anchorCtr="0">
-            <a:normAutofit/>
-          </a:bodyPr>
-          <a:lstStyle/>
-          <a:p>
-            <a:pPr marL="457200" lvl="0" indent="-323850" algn="l" rtl="0">
-              <a:spcBef>
-                <a:spcPts val="0"/>
-              </a:spcBef>
-              <a:spcAft>
-                <a:spcPts val="0"/>
-              </a:spcAft>
-              <a:buClr>
-                <a:schemeClr val="dk1"/>
-              </a:buClr>
-              <a:buSzPts val="1500"/>
-              <a:buChar char="●"/>
-            </a:pPr>
-            <a:r>
-              <a:rPr lang="en" sz="1500" dirty="0">
-                <a:solidFill>
-                  <a:schemeClr val="dk1"/>
-                </a:solidFill>
-              </a:rPr>
-              <a:t>Pada tahap </a:t>
-            </a:r>
-            <a:r>
-              <a:rPr lang="en" sz="1500" b="1" i="1" dirty="0">
-                <a:solidFill>
-                  <a:schemeClr val="dk1"/>
-                </a:solidFill>
-              </a:rPr>
-              <a:t>cleaning data</a:t>
-            </a:r>
-            <a:r>
-              <a:rPr lang="en" sz="1500" dirty="0">
-                <a:solidFill>
-                  <a:schemeClr val="dk1"/>
-                </a:solidFill>
-              </a:rPr>
-              <a:t>, tunjukan</a:t>
-            </a:r>
-            <a:r>
-              <a:rPr lang="en" sz="1500" i="1" dirty="0">
-                <a:solidFill>
-                  <a:schemeClr val="dk1"/>
-                </a:solidFill>
-              </a:rPr>
-              <a:t> </a:t>
-            </a:r>
-            <a:r>
-              <a:rPr lang="en" sz="1500" b="1" i="1" dirty="0">
-                <a:solidFill>
-                  <a:schemeClr val="dk1"/>
-                </a:solidFill>
-              </a:rPr>
-              <a:t>null</a:t>
-            </a:r>
-            <a:r>
-              <a:rPr lang="en" sz="1500" b="1" dirty="0">
-                <a:solidFill>
-                  <a:schemeClr val="dk1"/>
-                </a:solidFill>
-              </a:rPr>
-              <a:t> </a:t>
-            </a:r>
-            <a:r>
-              <a:rPr lang="en" sz="1500" dirty="0">
-                <a:solidFill>
-                  <a:schemeClr val="dk1"/>
-                </a:solidFill>
-              </a:rPr>
-              <a:t>atau </a:t>
-            </a:r>
-            <a:r>
-              <a:rPr lang="en" sz="1500" b="1" i="1" dirty="0">
-                <a:solidFill>
-                  <a:schemeClr val="dk1"/>
-                </a:solidFill>
-              </a:rPr>
-              <a:t>missing value</a:t>
-            </a:r>
-            <a:r>
-              <a:rPr lang="en" sz="1500" dirty="0">
-                <a:solidFill>
-                  <a:schemeClr val="dk1"/>
-                </a:solidFill>
-              </a:rPr>
-              <a:t> serta </a:t>
-            </a:r>
-            <a:r>
-              <a:rPr lang="en" sz="1500" b="1" i="1" dirty="0">
-                <a:solidFill>
-                  <a:schemeClr val="dk1"/>
-                </a:solidFill>
-              </a:rPr>
-              <a:t>duplicated value</a:t>
-            </a:r>
-            <a:r>
-              <a:rPr lang="en" sz="1500" dirty="0">
-                <a:solidFill>
-                  <a:schemeClr val="dk1"/>
-                </a:solidFill>
-              </a:rPr>
-              <a:t> pada dataset, serta cara penyelesaiannya.</a:t>
-            </a:r>
-            <a:endParaRPr sz="1500" dirty="0">
-              <a:solidFill>
-                <a:schemeClr val="dk1"/>
-              </a:solidFill>
-            </a:endParaRPr>
-          </a:p>
-          <a:p>
-            <a:pPr marL="457200" lvl="0" indent="0" algn="l" rtl="0">
-              <a:spcBef>
-                <a:spcPts val="1200"/>
-              </a:spcBef>
-              <a:spcAft>
-                <a:spcPts val="0"/>
-              </a:spcAft>
-              <a:buNone/>
-            </a:pPr>
-            <a:endParaRPr sz="1500" dirty="0">
-              <a:solidFill>
-                <a:schemeClr val="dk1"/>
-              </a:solidFill>
-            </a:endParaRPr>
-          </a:p>
-          <a:p>
-            <a:pPr marL="457200" lvl="0" indent="-323850" algn="l" rtl="0">
-              <a:spcBef>
-                <a:spcPts val="1200"/>
-              </a:spcBef>
-              <a:spcAft>
-                <a:spcPts val="0"/>
-              </a:spcAft>
-              <a:buClr>
-                <a:schemeClr val="dk1"/>
-              </a:buClr>
-              <a:buSzPts val="1500"/>
-              <a:buChar char="●"/>
-            </a:pPr>
-            <a:r>
-              <a:rPr lang="en" sz="1500" dirty="0">
-                <a:solidFill>
-                  <a:schemeClr val="dk1"/>
-                </a:solidFill>
-              </a:rPr>
-              <a:t>Selanjutnya untuk data preprocessing, tunjukan bahwa data sudah dilakukan proses </a:t>
-            </a:r>
-            <a:r>
-              <a:rPr lang="en" sz="1500" b="1" i="1" dirty="0">
-                <a:solidFill>
-                  <a:schemeClr val="dk1"/>
-                </a:solidFill>
-              </a:rPr>
-              <a:t>feature encoding</a:t>
-            </a:r>
-            <a:r>
-              <a:rPr lang="en" sz="1500" dirty="0">
-                <a:solidFill>
-                  <a:schemeClr val="dk1"/>
-                </a:solidFill>
-              </a:rPr>
-              <a:t> dan </a:t>
-            </a:r>
-            <a:r>
-              <a:rPr lang="en" sz="1500" b="1" i="1" dirty="0">
-                <a:solidFill>
-                  <a:schemeClr val="dk1"/>
-                </a:solidFill>
-              </a:rPr>
-              <a:t>feature standardisation</a:t>
-            </a:r>
-            <a:r>
-              <a:rPr lang="en" sz="1500" dirty="0">
-                <a:solidFill>
-                  <a:schemeClr val="dk1"/>
-                </a:solidFill>
-              </a:rPr>
-              <a:t>.</a:t>
-            </a:r>
-            <a:endParaRPr sz="1500" dirty="0">
-              <a:solidFill>
-                <a:schemeClr val="dk1"/>
-              </a:solidFill>
-            </a:endParaRPr>
-          </a:p>
-          <a:p>
-            <a:pPr marL="457200" lvl="0" indent="0" algn="l" rtl="0">
-              <a:spcBef>
-                <a:spcPts val="1200"/>
-              </a:spcBef>
-              <a:spcAft>
-                <a:spcPts val="0"/>
-              </a:spcAft>
-              <a:buNone/>
-            </a:pPr>
-            <a:endParaRPr sz="1500" dirty="0">
-              <a:solidFill>
-                <a:schemeClr val="dk1"/>
-              </a:solidFill>
-            </a:endParaRPr>
-          </a:p>
-          <a:p>
-            <a:pPr marL="457200" lvl="0" indent="-323850" algn="l" rtl="0">
-              <a:spcBef>
-                <a:spcPts val="1200"/>
-              </a:spcBef>
-              <a:spcAft>
-                <a:spcPts val="0"/>
-              </a:spcAft>
-              <a:buClr>
-                <a:schemeClr val="dk1"/>
-              </a:buClr>
-              <a:buSzPts val="1500"/>
-              <a:buChar char="●"/>
-            </a:pPr>
-            <a:r>
-              <a:rPr lang="en" sz="1500" b="1" dirty="0">
-                <a:solidFill>
-                  <a:schemeClr val="dk1"/>
-                </a:solidFill>
-              </a:rPr>
-              <a:t>Source code</a:t>
-            </a:r>
-            <a:r>
-              <a:rPr lang="en" sz="1500" dirty="0">
-                <a:solidFill>
-                  <a:schemeClr val="dk1"/>
-                </a:solidFill>
-              </a:rPr>
-              <a:t> yang sudah kamu buat, dapat ditampilkan dan berikan link untuk mengakses file tersebut. Contohnya seperti di pojok kanan bawah.</a:t>
-            </a:r>
-            <a:endParaRPr sz="1500" dirty="0">
-              <a:solidFill>
-                <a:schemeClr val="dk1"/>
-              </a:solidFill>
-            </a:endParaRPr>
-          </a:p>
-        </p:txBody>
-      </p:sp>
-      <p:sp>
-        <p:nvSpPr>
-          <p:cNvPr id="56" name="Google Shape;56;p13"/>
-          <p:cNvSpPr txBox="1"/>
-          <p:nvPr/>
-        </p:nvSpPr>
-        <p:spPr>
-          <a:xfrm>
-            <a:off x="4656000" y="4772700"/>
-            <a:ext cx="4488000" cy="354000"/>
-          </a:xfrm>
-          <a:prstGeom prst="rect">
-            <a:avLst/>
-          </a:prstGeom>
-          <a:noFill/>
-          <a:ln>
-            <a:noFill/>
-          </a:ln>
-        </p:spPr>
-        <p:txBody>
-          <a:bodyPr spcFirstLastPara="1" wrap="square" lIns="91425" tIns="91425" rIns="91425" bIns="91425" anchor="t" anchorCtr="0">
-            <a:spAutoFit/>
-          </a:bodyPr>
-          <a:lstStyle/>
-          <a:p>
-            <a:pPr marL="0" lvl="0" indent="0" algn="r" rtl="0">
-              <a:lnSpc>
-                <a:spcPct val="100000"/>
-              </a:lnSpc>
-              <a:spcBef>
-                <a:spcPts val="0"/>
-              </a:spcBef>
-              <a:spcAft>
-                <a:spcPts val="0"/>
-              </a:spcAft>
-              <a:buNone/>
-            </a:pPr>
-            <a:r>
-              <a:rPr lang="en" sz="1100" dirty="0">
-                <a:solidFill>
-                  <a:srgbClr val="000000"/>
-                </a:solidFill>
-              </a:rPr>
-              <a:t>Untuk selengkapnya, dapat melihat jupyter notebook </a:t>
-            </a:r>
-            <a:r>
-              <a:rPr lang="en" sz="1100" dirty="0"/>
-              <a:t>disini</a:t>
-            </a:r>
-            <a:endParaRPr sz="1100" dirty="0">
-              <a:solidFill>
-                <a:srgbClr val="000000"/>
-              </a:solidFill>
-            </a:endParaRPr>
-          </a:p>
-        </p:txBody>
-      </p:sp>
-    </p:spTree>
   </p:cSld>
   <p:clrMapOvr>
     <a:masterClrMapping/>
@@ -8480,13 +9250,23 @@
               <a:buNone/>
             </a:pPr>
             <a:r>
-              <a:rPr lang="en-ID" sz="1600" b="1" dirty="0">
-                <a:solidFill>
-                  <a:schemeClr val="bg1"/>
-                </a:solidFill>
+              <a:rPr lang="en" sz="1798" b="1">
+                <a:latin typeface="Roboto"/>
+                <a:ea typeface="Roboto"/>
+                <a:cs typeface="Roboto"/>
+                <a:sym typeface="Roboto"/>
               </a:rPr>
-              <a:t>Feature Engineering</a:t>
+              <a:t>Data Cleaning &amp; Preprocessing</a:t>
             </a:r>
+            <a:endParaRPr sz="1798">
+              <a:solidFill>
+                <a:schemeClr val="lt1"/>
+              </a:solidFill>
+              <a:latin typeface="Roboto"/>
+              <a:ea typeface="Roboto"/>
+              <a:cs typeface="Roboto"/>
+              <a:sym typeface="Roboto"/>
+            </a:endParaRPr>
           </a:p>
         </p:txBody>
       </p:sp>
@@ -8495,7 +9275,7 @@
           <p:cNvPr id="2" name="Google Shape;55;p13">
             <a:extLst>
               <a:ext uri="{FF2B5EF4-FFF2-40B4-BE49-F238E27FC236}">
-                <a16:creationId xmlns:a16="http://schemas.microsoft.com/office/drawing/2014/main" id="{C4612E69-FC28-3BD2-D326-CD1F9996F808}"/>
+                <a16:creationId xmlns:a16="http://schemas.microsoft.com/office/drawing/2014/main" id="{F20F9562-6705-B4D0-B0B7-A44492A7FB4A}"/>
               </a:ext>
             </a:extLst>
           </p:cNvPr>
@@ -8506,8 +9286,8 @@
         </p:nvSpPr>
         <p:spPr>
           <a:xfrm>
-            <a:off x="177315" y="776732"/>
-            <a:ext cx="8789370" cy="3936643"/>
+            <a:off x="177315" y="603429"/>
+            <a:ext cx="8779649" cy="442590"/>
           </a:xfrm>
           <a:prstGeom prst="rect">
             <a:avLst/>
@@ -8519,7 +9299,7 @@
         </p:spPr>
         <p:txBody>
           <a:bodyPr spcFirstLastPara="1" wrap="square" lIns="91425" tIns="91425" rIns="91425" bIns="91425" anchor="t" anchorCtr="0">
-            <a:normAutofit/>
+            <a:noAutofit/>
           </a:bodyPr>
           <a:lstStyle>
             <a:defPPr marR="0" lvl="0" algn="l" rtl="0">
@@ -8773,345 +9553,277 @@
               <a:buNone/>
             </a:pPr>
             <a:r>
-              <a:rPr lang="en-US" sz="1600" dirty="0">
-                <a:solidFill>
-                  <a:schemeClr val="tx1"/>
-                </a:solidFill>
+              <a:rPr lang="en-US" sz="1400" b="1" dirty="0">
+                <a:solidFill>
+                  <a:schemeClr val="dk1"/>
+                </a:solidFill>
+              </a:rPr>
+              <a:t>Feature Encoding</a:t>
+            </a:r>
+          </a:p>
+        </p:txBody>
+      </p:sp>
+      <p:sp>
+        <p:nvSpPr>
+          <p:cNvPr id="9" name="TextBox 8">
+            <a:extLst>
+              <a:ext uri="{FF2B5EF4-FFF2-40B4-BE49-F238E27FC236}">
+                <a16:creationId xmlns:a16="http://schemas.microsoft.com/office/drawing/2014/main" id="{B4EE2CE7-96C3-2B90-60C4-819168952D3B}"/>
+              </a:ext>
+            </a:extLst>
+          </p:cNvPr>
+          <p:cNvSpPr txBox="1"/>
+          <p:nvPr/>
+        </p:nvSpPr>
+        <p:spPr>
+          <a:xfrm>
+            <a:off x="293410" y="1046019"/>
+            <a:ext cx="8663554" cy="1169551"/>
+          </a:xfrm>
+          <a:prstGeom prst="rect">
+            <a:avLst/>
+          </a:prstGeom>
+          <a:noFill/>
+        </p:spPr>
+        <p:txBody>
+          <a:bodyPr wrap="square" rtlCol="0">
+            <a:spAutoFit/>
+          </a:bodyPr>
+          <a:lstStyle/>
+          <a:p>
+            <a:r>
+              <a:rPr lang="en-US" dirty="0">
                 <a:latin typeface="Dosis" pitchFamily="2" charset="0"/>
               </a:rPr>
-              <a:t>Create new columns based on the existing columns such as :</a:t>
+              <a:t>There are 3 categorical column that will be encoded based on their data type.</a:t>
             </a:r>
           </a:p>
           <a:p>
-            <a:pPr marL="114300" indent="0">
-              <a:buNone/>
-            </a:pPr>
-            <a:endParaRPr lang="en-US" sz="1600" dirty="0">
-              <a:solidFill>
-                <a:schemeClr val="tx1"/>
-              </a:solidFill>
+            <a:endParaRPr lang="en-US" dirty="0">
               <a:latin typeface="Dosis" pitchFamily="2" charset="0"/>
             </a:endParaRPr>
           </a:p>
           <a:p>
+            <a:pPr marL="285750" indent="-285750">
+              <a:buFont typeface="Arial" panose="020B0604020202020204" pitchFamily="34" charset="0"/>
+              <a:buChar char="•"/>
+            </a:pPr>
             <a:r>
-              <a:rPr lang="en-US" sz="1600" b="1" dirty="0">
-                <a:solidFill>
-                  <a:schemeClr val="tx1"/>
-                </a:solidFill>
-                <a:effectLst/>
+              <a:rPr lang="en-ID" dirty="0">
                 <a:latin typeface="Dosis" pitchFamily="2" charset="0"/>
               </a:rPr>
-              <a:t>Age</a:t>
+              <a:t>Education : Ordinal type </a:t>
             </a:r>
             <a:r>
-              <a:rPr lang="en-US" sz="1600" b="0" dirty="0">
-                <a:solidFill>
-                  <a:schemeClr val="tx1"/>
-                </a:solidFill>
-                <a:effectLst/>
+              <a:rPr lang="en-ID" dirty="0">
                 <a:latin typeface="Dosis" pitchFamily="2" charset="0"/>
+                <a:sym typeface="Wingdings" panose="05000000000000000000" pitchFamily="2" charset="2"/>
               </a:rPr>
-              <a:t> : calculating the age of each customer based on their birth year and current time.</a:t>
+              <a:t> Label encoding</a:t>
             </a:r>
           </a:p>
           <a:p>
+            <a:pPr marL="285750" indent="-285750">
+              <a:buFont typeface="Arial" panose="020B0604020202020204" pitchFamily="34" charset="0"/>
+              <a:buChar char="•"/>
+            </a:pPr>
             <a:r>
-              <a:rPr lang="en-US" sz="1600" b="1" dirty="0" err="1">
-                <a:solidFill>
-                  <a:schemeClr val="tx1"/>
-                </a:solidFill>
+              <a:rPr lang="en-ID" dirty="0" err="1">
                 <a:latin typeface="Dosis" pitchFamily="2" charset="0"/>
               </a:rPr>
               <a:t>Age_Group</a:t>
             </a:r>
             <a:r>
-              <a:rPr lang="en-US" sz="1600" b="1" dirty="0">
-                <a:solidFill>
-                  <a:schemeClr val="tx1"/>
-                </a:solidFill>
+              <a:rPr lang="en-ID" dirty="0">
                 <a:latin typeface="Dosis" pitchFamily="2" charset="0"/>
               </a:rPr>
-              <a:t> </a:t>
+              <a:t> : Ordinal type </a:t>
             </a:r>
             <a:r>
-              <a:rPr lang="en-US" sz="1600" dirty="0">
-                <a:solidFill>
-                  <a:schemeClr val="tx1"/>
-                </a:solidFill>
+              <a:rPr lang="en-ID" dirty="0">
                 <a:latin typeface="Dosis" pitchFamily="2" charset="0"/>
+                <a:sym typeface="Wingdings" panose="05000000000000000000" pitchFamily="2" charset="2"/>
               </a:rPr>
-              <a:t>: grouping the `age` column into category based on the distribution </a:t>
+              <a:t> Label encoding</a:t>
             </a:r>
           </a:p>
           <a:p>
+            <a:pPr marL="285750" indent="-285750">
+              <a:buFont typeface="Arial" panose="020B0604020202020204" pitchFamily="34" charset="0"/>
+              <a:buChar char="•"/>
+            </a:pPr>
             <a:r>
-              <a:rPr lang="en-US" sz="1600" b="1" dirty="0" err="1">
-                <a:solidFill>
-                  <a:schemeClr val="tx1"/>
-                </a:solidFill>
-                <a:effectLst/>
+              <a:rPr lang="en-ID" dirty="0" err="1">
+                <a:latin typeface="Dosis" pitchFamily="2" charset="0"/>
+                <a:sym typeface="Wingdings" panose="05000000000000000000" pitchFamily="2" charset="2"/>
+              </a:rPr>
+              <a:t>Marital_Status</a:t>
+            </a:r>
+            <a:r>
+              <a:rPr lang="en-ID" dirty="0">
+                <a:latin typeface="Dosis" pitchFamily="2" charset="0"/>
+                <a:sym typeface="Wingdings" panose="05000000000000000000" pitchFamily="2" charset="2"/>
+              </a:rPr>
+              <a:t> : </a:t>
+            </a:r>
+            <a:r>
+              <a:rPr lang="en-ID" dirty="0">
                 <a:latin typeface="Dosis" pitchFamily="2" charset="0"/>
               </a:rPr>
-              <a:t>Num_Child</a:t>
+              <a:t>Nominal type </a:t>
             </a:r>
             <a:r>
-              <a:rPr lang="en-US" sz="1600" b="1" dirty="0">
-                <a:solidFill>
-                  <a:schemeClr val="tx1"/>
-                </a:solidFill>
-                <a:effectLst/>
+              <a:rPr lang="en-ID" dirty="0">
                 <a:latin typeface="Dosis" pitchFamily="2" charset="0"/>
+                <a:sym typeface="Wingdings" panose="05000000000000000000" pitchFamily="2" charset="2"/>
               </a:rPr>
-              <a:t> </a:t>
+              <a:t> One-hot encoding</a:t>
             </a:r>
-            <a:r>
-              <a:rPr lang="en-US" sz="1600" b="0" dirty="0">
-                <a:solidFill>
-                  <a:schemeClr val="tx1"/>
-                </a:solidFill>
-                <a:effectLst/>
-                <a:latin typeface="Dosis" pitchFamily="2" charset="0"/>
-              </a:rPr>
-              <a:t>: sum the values of </a:t>
-            </a:r>
-            <a:r>
-              <a:rPr lang="en-US" sz="1600" b="0" dirty="0" err="1">
-                <a:solidFill>
-                  <a:schemeClr val="tx1"/>
-                </a:solidFill>
-                <a:effectLst/>
-                <a:latin typeface="Dosis" pitchFamily="2" charset="0"/>
-              </a:rPr>
-              <a:t>Kidhome</a:t>
-            </a:r>
-            <a:r>
-              <a:rPr lang="en-US" sz="1600" b="0" dirty="0">
-                <a:solidFill>
-                  <a:schemeClr val="tx1"/>
-                </a:solidFill>
-                <a:effectLst/>
-                <a:latin typeface="Dosis" pitchFamily="2" charset="0"/>
-              </a:rPr>
-              <a:t> and </a:t>
-            </a:r>
-            <a:r>
-              <a:rPr lang="en-US" sz="1600" b="0" dirty="0" err="1">
-                <a:solidFill>
-                  <a:schemeClr val="tx1"/>
-                </a:solidFill>
-                <a:effectLst/>
-                <a:latin typeface="Dosis" pitchFamily="2" charset="0"/>
-              </a:rPr>
-              <a:t>Teenhome</a:t>
-            </a:r>
-            <a:r>
-              <a:rPr lang="en-US" sz="1600" b="0" dirty="0">
-                <a:solidFill>
-                  <a:schemeClr val="tx1"/>
-                </a:solidFill>
-                <a:effectLst/>
-                <a:latin typeface="Dosis" pitchFamily="2" charset="0"/>
-              </a:rPr>
-              <a:t>, representing the total number of dependents or children a customer has.</a:t>
-            </a:r>
-          </a:p>
-          <a:p>
-            <a:r>
-              <a:rPr lang="en-US" sz="1600" b="1" dirty="0" err="1">
-                <a:solidFill>
-                  <a:schemeClr val="tx1"/>
-                </a:solidFill>
-                <a:latin typeface="Dosis" pitchFamily="2" charset="0"/>
-              </a:rPr>
-              <a:t>Membership_Duration</a:t>
-            </a:r>
-            <a:r>
-              <a:rPr lang="en-US" sz="1600" b="1" dirty="0">
-                <a:solidFill>
-                  <a:schemeClr val="tx1"/>
-                </a:solidFill>
-                <a:latin typeface="Dosis" pitchFamily="2" charset="0"/>
-              </a:rPr>
-              <a:t> </a:t>
-            </a:r>
-            <a:r>
-              <a:rPr lang="en-US" sz="1600" dirty="0">
-                <a:solidFill>
-                  <a:schemeClr val="tx1"/>
-                </a:solidFill>
-                <a:latin typeface="Dosis" pitchFamily="2" charset="0"/>
-              </a:rPr>
-              <a:t>: duration of customer membership in year.</a:t>
-            </a:r>
-          </a:p>
-          <a:p>
-            <a:r>
-              <a:rPr lang="en-US" sz="1600" b="1" dirty="0" err="1">
-                <a:solidFill>
-                  <a:schemeClr val="tx1"/>
-                </a:solidFill>
-                <a:effectLst/>
-                <a:latin typeface="Dosis" pitchFamily="2" charset="0"/>
-              </a:rPr>
-              <a:t>Total_Acc_Camp</a:t>
-            </a:r>
-            <a:r>
-              <a:rPr lang="en-US" sz="1600" b="1" dirty="0">
-                <a:solidFill>
-                  <a:schemeClr val="tx1"/>
-                </a:solidFill>
-                <a:effectLst/>
-                <a:latin typeface="Dosis" pitchFamily="2" charset="0"/>
-              </a:rPr>
-              <a:t> </a:t>
-            </a:r>
-            <a:r>
-              <a:rPr lang="en-US" sz="1600" b="0" dirty="0">
-                <a:solidFill>
-                  <a:schemeClr val="tx1"/>
-                </a:solidFill>
-                <a:effectLst/>
-                <a:latin typeface="Dosis" pitchFamily="2" charset="0"/>
-              </a:rPr>
-              <a:t>: the total number of times each customer responded to the 5 campaigns that were conducted (</a:t>
-            </a:r>
-            <a:r>
-              <a:rPr lang="en-US" sz="1600" b="0" dirty="0" err="1">
-                <a:solidFill>
-                  <a:schemeClr val="tx1"/>
-                </a:solidFill>
-                <a:effectLst/>
-                <a:latin typeface="Dosis" pitchFamily="2" charset="0"/>
-              </a:rPr>
-              <a:t>AcceptedCmp</a:t>
-            </a:r>
-            <a:r>
-              <a:rPr lang="en-US" sz="1600" b="0" dirty="0">
-                <a:solidFill>
-                  <a:schemeClr val="tx1"/>
-                </a:solidFill>
-                <a:effectLst/>
-                <a:latin typeface="Dosis" pitchFamily="2" charset="0"/>
-              </a:rPr>
-              <a:t> 1 - 5).</a:t>
-            </a:r>
-          </a:p>
-          <a:p>
-            <a:r>
-              <a:rPr lang="en-US" sz="1600" b="1" dirty="0" err="1">
-                <a:solidFill>
-                  <a:schemeClr val="tx1"/>
-                </a:solidFill>
-                <a:latin typeface="Dosis" pitchFamily="2" charset="0"/>
-              </a:rPr>
-              <a:t>Total_Spending</a:t>
-            </a:r>
-            <a:r>
-              <a:rPr lang="en-US" sz="1600" b="1" dirty="0">
-                <a:solidFill>
-                  <a:schemeClr val="tx1"/>
-                </a:solidFill>
-                <a:latin typeface="Dosis" pitchFamily="2" charset="0"/>
-              </a:rPr>
-              <a:t> </a:t>
-            </a:r>
-            <a:r>
-              <a:rPr lang="en-US" sz="1600" dirty="0">
-                <a:solidFill>
-                  <a:schemeClr val="tx1"/>
-                </a:solidFill>
-                <a:latin typeface="Dosis" pitchFamily="2" charset="0"/>
-              </a:rPr>
-              <a:t>: total purchase amount of each customer across all products.</a:t>
-            </a:r>
-          </a:p>
-          <a:p>
-            <a:r>
-              <a:rPr lang="en-US" sz="1600" b="1" dirty="0" err="1">
-                <a:solidFill>
-                  <a:schemeClr val="tx1"/>
-                </a:solidFill>
-                <a:effectLst/>
-                <a:latin typeface="Dosis" pitchFamily="2" charset="0"/>
-              </a:rPr>
-              <a:t>Total_Purchases</a:t>
-            </a:r>
-            <a:r>
-              <a:rPr lang="en-US" sz="1600" b="1" dirty="0">
-                <a:solidFill>
-                  <a:schemeClr val="tx1"/>
-                </a:solidFill>
-                <a:effectLst/>
-                <a:latin typeface="Dosis" pitchFamily="2" charset="0"/>
-              </a:rPr>
-              <a:t> </a:t>
-            </a:r>
-            <a:r>
-              <a:rPr lang="en-US" sz="1600" b="0" dirty="0">
-                <a:solidFill>
-                  <a:schemeClr val="tx1"/>
-                </a:solidFill>
-                <a:effectLst/>
-                <a:latin typeface="Dosis" pitchFamily="2" charset="0"/>
-              </a:rPr>
-              <a:t>: the total purchase amount of each customer across all types of transactions.</a:t>
-            </a:r>
-          </a:p>
-          <a:p>
-            <a:r>
-              <a:rPr lang="en-US" sz="1600" b="1" dirty="0">
-                <a:solidFill>
-                  <a:schemeClr val="tx1"/>
-                </a:solidFill>
-                <a:latin typeface="Dosis" pitchFamily="2" charset="0"/>
-              </a:rPr>
-              <a:t>CVR (Conversion Rate) </a:t>
-            </a:r>
-            <a:r>
-              <a:rPr lang="en-US" sz="1600" dirty="0">
-                <a:solidFill>
-                  <a:schemeClr val="tx1"/>
-                </a:solidFill>
-                <a:latin typeface="Dosis" pitchFamily="2" charset="0"/>
-              </a:rPr>
-              <a:t>: the ratio of </a:t>
-            </a:r>
-            <a:r>
-              <a:rPr lang="en-US" sz="1600" dirty="0" err="1">
-                <a:solidFill>
-                  <a:schemeClr val="tx1"/>
-                </a:solidFill>
-                <a:latin typeface="Dosis" pitchFamily="2" charset="0"/>
-              </a:rPr>
-              <a:t>Total_Purchases</a:t>
-            </a:r>
-            <a:r>
-              <a:rPr lang="en-US" sz="1600" dirty="0">
-                <a:solidFill>
-                  <a:schemeClr val="tx1"/>
-                </a:solidFill>
-                <a:latin typeface="Dosis" pitchFamily="2" charset="0"/>
-              </a:rPr>
-              <a:t> to the Number of Web Visits for each customer. It represents the percentage of website visitors who made purchases.</a:t>
-            </a:r>
-          </a:p>
-          <a:p>
-            <a:endParaRPr lang="en-US" sz="1600" b="0" dirty="0">
-              <a:solidFill>
-                <a:schemeClr val="tx1"/>
-              </a:solidFill>
-              <a:effectLst/>
+            <a:endParaRPr lang="en-ID" dirty="0">
               <a:latin typeface="Dosis" pitchFamily="2" charset="0"/>
             </a:endParaRPr>
           </a:p>
+        </p:txBody>
+      </p:sp>
+      <p:pic>
+        <p:nvPicPr>
+          <p:cNvPr id="8" name="Picture 7">
+            <a:extLst>
+              <a:ext uri="{FF2B5EF4-FFF2-40B4-BE49-F238E27FC236}">
+                <a16:creationId xmlns:a16="http://schemas.microsoft.com/office/drawing/2014/main" id="{F2E5FDEC-80B4-A347-F3BB-A42E636AC2C2}"/>
+              </a:ext>
+            </a:extLst>
+          </p:cNvPr>
+          <p:cNvPicPr>
+            <a:picLocks noChangeAspect="1"/>
+          </p:cNvPicPr>
+          <p:nvPr/>
+        </p:nvPicPr>
+        <p:blipFill>
+          <a:blip r:embed="rId3"/>
+          <a:stretch>
+            <a:fillRect/>
+          </a:stretch>
+        </p:blipFill>
+        <p:spPr>
+          <a:xfrm>
+            <a:off x="504310" y="2484983"/>
+            <a:ext cx="2336676" cy="1250721"/>
+          </a:xfrm>
+          <a:prstGeom prst="rect">
+            <a:avLst/>
+          </a:prstGeom>
+        </p:spPr>
+      </p:pic>
+      <p:pic>
+        <p:nvPicPr>
+          <p:cNvPr id="13" name="Picture 12">
+            <a:extLst>
+              <a:ext uri="{FF2B5EF4-FFF2-40B4-BE49-F238E27FC236}">
+                <a16:creationId xmlns:a16="http://schemas.microsoft.com/office/drawing/2014/main" id="{DAE10FC2-6230-70C7-DE1B-12244A442F6F}"/>
+              </a:ext>
+            </a:extLst>
+          </p:cNvPr>
+          <p:cNvPicPr>
+            <a:picLocks noChangeAspect="1"/>
+          </p:cNvPicPr>
+          <p:nvPr/>
+        </p:nvPicPr>
+        <p:blipFill>
+          <a:blip r:embed="rId4"/>
+          <a:stretch>
+            <a:fillRect/>
+          </a:stretch>
+        </p:blipFill>
+        <p:spPr>
+          <a:xfrm>
+            <a:off x="504310" y="3915446"/>
+            <a:ext cx="7077606" cy="1001717"/>
+          </a:xfrm>
+          <a:prstGeom prst="rect">
+            <a:avLst/>
+          </a:prstGeom>
+        </p:spPr>
+      </p:pic>
+      <p:sp>
+        <p:nvSpPr>
+          <p:cNvPr id="14" name="TextBox 13">
+            <a:extLst>
+              <a:ext uri="{FF2B5EF4-FFF2-40B4-BE49-F238E27FC236}">
+                <a16:creationId xmlns:a16="http://schemas.microsoft.com/office/drawing/2014/main" id="{5D7E2E35-EB33-C32C-37E8-6615CF988213}"/>
+              </a:ext>
+            </a:extLst>
+          </p:cNvPr>
+          <p:cNvSpPr txBox="1"/>
+          <p:nvPr/>
+        </p:nvSpPr>
+        <p:spPr>
+          <a:xfrm>
+            <a:off x="2939230" y="2901954"/>
+            <a:ext cx="1627909" cy="307777"/>
+          </a:xfrm>
+          <a:prstGeom prst="rect">
+            <a:avLst/>
+          </a:prstGeom>
+          <a:noFill/>
+        </p:spPr>
+        <p:txBody>
+          <a:bodyPr wrap="square" rtlCol="0">
+            <a:spAutoFit/>
+          </a:bodyPr>
+          <a:lstStyle/>
           <a:p>
-            <a:endParaRPr lang="en-US" sz="1600" b="0" dirty="0">
+            <a:r>
+              <a:rPr lang="en-US" b="1" dirty="0">
+                <a:solidFill>
+                  <a:srgbClr val="FF0000"/>
+                </a:solidFill>
+              </a:rPr>
+              <a:t>Before Encoding</a:t>
+            </a:r>
+          </a:p>
+        </p:txBody>
+      </p:sp>
+      <p:sp>
+        <p:nvSpPr>
+          <p:cNvPr id="16" name="TextBox 15">
+            <a:extLst>
+              <a:ext uri="{FF2B5EF4-FFF2-40B4-BE49-F238E27FC236}">
+                <a16:creationId xmlns:a16="http://schemas.microsoft.com/office/drawing/2014/main" id="{34489FFE-52E0-D944-79AC-3FACF3D5FBE9}"/>
+              </a:ext>
+            </a:extLst>
+          </p:cNvPr>
+          <p:cNvSpPr txBox="1"/>
+          <p:nvPr/>
+        </p:nvSpPr>
+        <p:spPr>
+          <a:xfrm>
+            <a:off x="7668491" y="4262415"/>
+            <a:ext cx="1475509" cy="307777"/>
+          </a:xfrm>
+          <a:prstGeom prst="rect">
+            <a:avLst/>
+          </a:prstGeom>
+          <a:noFill/>
+        </p:spPr>
+        <p:txBody>
+          <a:bodyPr wrap="square">
+            <a:spAutoFit/>
+          </a:bodyPr>
+          <a:lstStyle/>
+          <a:p>
+            <a:r>
+              <a:rPr lang="en-US" b="1" dirty="0">
+                <a:solidFill>
+                  <a:srgbClr val="00B050"/>
+                </a:solidFill>
+              </a:rPr>
+              <a:t>After Encoding</a:t>
+            </a:r>
+            <a:endParaRPr lang="en-ID" b="1" dirty="0">
               <a:solidFill>
-                <a:schemeClr val="tx1"/>
+                <a:srgbClr val="00B050"/>
               </a:solidFill>
-              <a:effectLst/>
-              <a:latin typeface="Dosis" pitchFamily="2" charset="0"/>
             </a:endParaRPr>
           </a:p>
         </p:txBody>
@@ -9119,7 +9831,571 @@
     </p:spTree>
     <p:extLst>
       <p:ext uri="{BB962C8B-B14F-4D97-AF65-F5344CB8AC3E}">
-        <p14:creationId xmlns:p14="http://schemas.microsoft.com/office/powerpoint/2010/main" val="221407396"/>
+        <p14:creationId xmlns:p14="http://schemas.microsoft.com/office/powerpoint/2010/main" val="2268143110"/>
+      </p:ext>
+    </p:extLst>
+  </p:cSld>
+  <p:clrMapOvr>
+    <a:masterClrMapping/>
+  </p:clrMapOvr>
+</p:sld>
+</file>
+
+<file path=ppt/slides/slide6.xml><?xml version="1.0" encoding="utf-8"?>
+<p:sld xmlns:a="http://schemas.openxmlformats.org/drawingml/2006/main" xmlns:r="http://schemas.openxmlformats.org/officeDocument/2006/relationships" xmlns:p="http://schemas.openxmlformats.org/presentationml/2006/main">
+  <p:cSld>
+    <p:spTree>
+      <p:nvGrpSpPr>
+        <p:cNvPr id="1" name="Shape 53"/>
+        <p:cNvGrpSpPr/>
+        <p:nvPr/>
+      </p:nvGrpSpPr>
+      <p:grpSpPr>
+        <a:xfrm>
+          <a:off x="0" y="0"/>
+          <a:ext cx="0" cy="0"/>
+          <a:chOff x="0" y="0"/>
+          <a:chExt cx="0" cy="0"/>
+        </a:xfrm>
+      </p:grpSpPr>
+      <p:sp>
+        <p:nvSpPr>
+          <p:cNvPr id="54" name="Google Shape;54;p13"/>
+          <p:cNvSpPr txBox="1">
+            <a:spLocks noGrp="1"/>
+          </p:cNvSpPr>
+          <p:nvPr>
+            <p:ph type="title"/>
+          </p:nvPr>
+        </p:nvSpPr>
+        <p:spPr>
+          <a:xfrm>
+            <a:off x="0" y="37175"/>
+            <a:ext cx="8180700" cy="523200"/>
+          </a:xfrm>
+          <a:prstGeom prst="rect">
+            <a:avLst/>
+          </a:prstGeom>
+        </p:spPr>
+        <p:txBody>
+          <a:bodyPr spcFirstLastPara="1" wrap="square" lIns="91425" tIns="91425" rIns="91425" bIns="91425" anchor="t" anchorCtr="0">
+            <a:noAutofit/>
+          </a:bodyPr>
+          <a:lstStyle/>
+          <a:p>
+            <a:pPr marL="0" lvl="0" indent="0" algn="ctr" rtl="0">
+              <a:spcBef>
+                <a:spcPts val="0"/>
+              </a:spcBef>
+              <a:spcAft>
+                <a:spcPts val="0"/>
+              </a:spcAft>
+              <a:buSzPts val="990"/>
+              <a:buNone/>
+            </a:pPr>
+            <a:r>
+              <a:rPr lang="en" sz="1798" b="1">
+                <a:latin typeface="Roboto"/>
+                <a:ea typeface="Roboto"/>
+                <a:cs typeface="Roboto"/>
+                <a:sym typeface="Roboto"/>
+              </a:rPr>
+              <a:t>Data Cleaning &amp; Preprocessing</a:t>
+            </a:r>
+            <a:endParaRPr sz="1798">
+              <a:solidFill>
+                <a:schemeClr val="lt1"/>
+              </a:solidFill>
+              <a:latin typeface="Roboto"/>
+              <a:ea typeface="Roboto"/>
+              <a:cs typeface="Roboto"/>
+              <a:sym typeface="Roboto"/>
+            </a:endParaRPr>
+          </a:p>
+        </p:txBody>
+      </p:sp>
+      <p:sp>
+        <p:nvSpPr>
+          <p:cNvPr id="2" name="Google Shape;55;p13">
+            <a:extLst>
+              <a:ext uri="{FF2B5EF4-FFF2-40B4-BE49-F238E27FC236}">
+                <a16:creationId xmlns:a16="http://schemas.microsoft.com/office/drawing/2014/main" id="{F20F9562-6705-B4D0-B0B7-A44492A7FB4A}"/>
+              </a:ext>
+            </a:extLst>
+          </p:cNvPr>
+          <p:cNvSpPr txBox="1">
+            <a:spLocks/>
+          </p:cNvSpPr>
+          <p:nvPr/>
+        </p:nvSpPr>
+        <p:spPr>
+          <a:xfrm>
+            <a:off x="177315" y="603429"/>
+            <a:ext cx="8779649" cy="442590"/>
+          </a:xfrm>
+          <a:prstGeom prst="rect">
+            <a:avLst/>
+          </a:prstGeom>
+          <a:noFill/>
+          <a:ln>
+            <a:noFill/>
+          </a:ln>
+        </p:spPr>
+        <p:txBody>
+          <a:bodyPr spcFirstLastPara="1" wrap="square" lIns="91425" tIns="91425" rIns="91425" bIns="91425" anchor="t" anchorCtr="0">
+            <a:noAutofit/>
+          </a:bodyPr>
+          <a:lstStyle>
+            <a:defPPr marR="0" lvl="0" algn="l" rtl="0">
+              <a:lnSpc>
+                <a:spcPct val="100000"/>
+              </a:lnSpc>
+              <a:spcBef>
+                <a:spcPts val="0"/>
+              </a:spcBef>
+              <a:spcAft>
+                <a:spcPts val="0"/>
+              </a:spcAft>
+            </a:defPPr>
+            <a:lvl1pPr marL="457200" marR="0" lvl="0" indent="-342900" algn="l" rtl="0">
+              <a:lnSpc>
+                <a:spcPct val="115000"/>
+              </a:lnSpc>
+              <a:spcBef>
+                <a:spcPts val="0"/>
+              </a:spcBef>
+              <a:spcAft>
+                <a:spcPts val="0"/>
+              </a:spcAft>
+              <a:buClr>
+                <a:schemeClr val="dk2"/>
+              </a:buClr>
+              <a:buSzPts val="1800"/>
+              <a:buFont typeface="Arial"/>
+              <a:buChar char="●"/>
+              <a:defRPr sz="1800" b="0" i="0" u="none" strike="noStrike" cap="none">
+                <a:solidFill>
+                  <a:schemeClr val="dk2"/>
+                </a:solidFill>
+                <a:latin typeface="Arial"/>
+                <a:ea typeface="Arial"/>
+                <a:cs typeface="Arial"/>
+                <a:sym typeface="Arial"/>
+              </a:defRPr>
+            </a:lvl1pPr>
+            <a:lvl2pPr marL="914400" marR="0" lvl="1" indent="-317500" algn="l" rtl="0">
+              <a:lnSpc>
+                <a:spcPct val="115000"/>
+              </a:lnSpc>
+              <a:spcBef>
+                <a:spcPts val="0"/>
+              </a:spcBef>
+              <a:spcAft>
+                <a:spcPts val="0"/>
+              </a:spcAft>
+              <a:buClr>
+                <a:schemeClr val="dk2"/>
+              </a:buClr>
+              <a:buSzPts val="1400"/>
+              <a:buFont typeface="Arial"/>
+              <a:buChar char="○"/>
+              <a:defRPr sz="1400" b="0" i="0" u="none" strike="noStrike" cap="none">
+                <a:solidFill>
+                  <a:schemeClr val="dk2"/>
+                </a:solidFill>
+                <a:latin typeface="Arial"/>
+                <a:ea typeface="Arial"/>
+                <a:cs typeface="Arial"/>
+                <a:sym typeface="Arial"/>
+              </a:defRPr>
+            </a:lvl2pPr>
+            <a:lvl3pPr marL="1371600" marR="0" lvl="2" indent="-317500" algn="l" rtl="0">
+              <a:lnSpc>
+                <a:spcPct val="115000"/>
+              </a:lnSpc>
+              <a:spcBef>
+                <a:spcPts val="0"/>
+              </a:spcBef>
+              <a:spcAft>
+                <a:spcPts val="0"/>
+              </a:spcAft>
+              <a:buClr>
+                <a:schemeClr val="dk2"/>
+              </a:buClr>
+              <a:buSzPts val="1400"/>
+              <a:buFont typeface="Arial"/>
+              <a:buChar char="■"/>
+              <a:defRPr sz="1400" b="0" i="0" u="none" strike="noStrike" cap="none">
+                <a:solidFill>
+                  <a:schemeClr val="dk2"/>
+                </a:solidFill>
+                <a:latin typeface="Arial"/>
+                <a:ea typeface="Arial"/>
+                <a:cs typeface="Arial"/>
+                <a:sym typeface="Arial"/>
+              </a:defRPr>
+            </a:lvl3pPr>
+            <a:lvl4pPr marL="1828800" marR="0" lvl="3" indent="-317500" algn="l" rtl="0">
+              <a:lnSpc>
+                <a:spcPct val="115000"/>
+              </a:lnSpc>
+              <a:spcBef>
+                <a:spcPts val="0"/>
+              </a:spcBef>
+              <a:spcAft>
+                <a:spcPts val="0"/>
+              </a:spcAft>
+              <a:buClr>
+                <a:schemeClr val="dk2"/>
+              </a:buClr>
+              <a:buSzPts val="1400"/>
+              <a:buFont typeface="Arial"/>
+              <a:buChar char="●"/>
+              <a:defRPr sz="1400" b="0" i="0" u="none" strike="noStrike" cap="none">
+                <a:solidFill>
+                  <a:schemeClr val="dk2"/>
+                </a:solidFill>
+                <a:latin typeface="Arial"/>
+                <a:ea typeface="Arial"/>
+                <a:cs typeface="Arial"/>
+                <a:sym typeface="Arial"/>
+              </a:defRPr>
+            </a:lvl4pPr>
+            <a:lvl5pPr marL="2286000" marR="0" lvl="4" indent="-317500" algn="l" rtl="0">
+              <a:lnSpc>
+                <a:spcPct val="115000"/>
+              </a:lnSpc>
+              <a:spcBef>
+                <a:spcPts val="0"/>
+              </a:spcBef>
+              <a:spcAft>
+                <a:spcPts val="0"/>
+              </a:spcAft>
+              <a:buClr>
+                <a:schemeClr val="dk2"/>
+              </a:buClr>
+              <a:buSzPts val="1400"/>
+              <a:buFont typeface="Arial"/>
+              <a:buChar char="○"/>
+              <a:defRPr sz="1400" b="0" i="0" u="none" strike="noStrike" cap="none">
+                <a:solidFill>
+                  <a:schemeClr val="dk2"/>
+                </a:solidFill>
+                <a:latin typeface="Arial"/>
+                <a:ea typeface="Arial"/>
+                <a:cs typeface="Arial"/>
+                <a:sym typeface="Arial"/>
+              </a:defRPr>
+            </a:lvl5pPr>
+            <a:lvl6pPr marL="2743200" marR="0" lvl="5" indent="-317500" algn="l" rtl="0">
+              <a:lnSpc>
+                <a:spcPct val="115000"/>
+              </a:lnSpc>
+              <a:spcBef>
+                <a:spcPts val="0"/>
+              </a:spcBef>
+              <a:spcAft>
+                <a:spcPts val="0"/>
+              </a:spcAft>
+              <a:buClr>
+                <a:schemeClr val="dk2"/>
+              </a:buClr>
+              <a:buSzPts val="1400"/>
+              <a:buFont typeface="Arial"/>
+              <a:buChar char="■"/>
+              <a:defRPr sz="1400" b="0" i="0" u="none" strike="noStrike" cap="none">
+                <a:solidFill>
+                  <a:schemeClr val="dk2"/>
+                </a:solidFill>
+                <a:latin typeface="Arial"/>
+                <a:ea typeface="Arial"/>
+                <a:cs typeface="Arial"/>
+                <a:sym typeface="Arial"/>
+              </a:defRPr>
+            </a:lvl6pPr>
+            <a:lvl7pPr marL="3200400" marR="0" lvl="6" indent="-317500" algn="l" rtl="0">
+              <a:lnSpc>
+                <a:spcPct val="115000"/>
+              </a:lnSpc>
+              <a:spcBef>
+                <a:spcPts val="0"/>
+              </a:spcBef>
+              <a:spcAft>
+                <a:spcPts val="0"/>
+              </a:spcAft>
+              <a:buClr>
+                <a:schemeClr val="dk2"/>
+              </a:buClr>
+              <a:buSzPts val="1400"/>
+              <a:buFont typeface="Arial"/>
+              <a:buChar char="●"/>
+              <a:defRPr sz="1400" b="0" i="0" u="none" strike="noStrike" cap="none">
+                <a:solidFill>
+                  <a:schemeClr val="dk2"/>
+                </a:solidFill>
+                <a:latin typeface="Arial"/>
+                <a:ea typeface="Arial"/>
+                <a:cs typeface="Arial"/>
+                <a:sym typeface="Arial"/>
+              </a:defRPr>
+            </a:lvl7pPr>
+            <a:lvl8pPr marL="3657600" marR="0" lvl="7" indent="-317500" algn="l" rtl="0">
+              <a:lnSpc>
+                <a:spcPct val="115000"/>
+              </a:lnSpc>
+              <a:spcBef>
+                <a:spcPts val="0"/>
+              </a:spcBef>
+              <a:spcAft>
+                <a:spcPts val="0"/>
+              </a:spcAft>
+              <a:buClr>
+                <a:schemeClr val="dk2"/>
+              </a:buClr>
+              <a:buSzPts val="1400"/>
+              <a:buFont typeface="Arial"/>
+              <a:buChar char="○"/>
+              <a:defRPr sz="1400" b="0" i="0" u="none" strike="noStrike" cap="none">
+                <a:solidFill>
+                  <a:schemeClr val="dk2"/>
+                </a:solidFill>
+                <a:latin typeface="Arial"/>
+                <a:ea typeface="Arial"/>
+                <a:cs typeface="Arial"/>
+                <a:sym typeface="Arial"/>
+              </a:defRPr>
+            </a:lvl8pPr>
+            <a:lvl9pPr marL="4114800" marR="0" lvl="8" indent="-317500" algn="l" rtl="0">
+              <a:lnSpc>
+                <a:spcPct val="115000"/>
+              </a:lnSpc>
+              <a:spcBef>
+                <a:spcPts val="0"/>
+              </a:spcBef>
+              <a:spcAft>
+                <a:spcPts val="0"/>
+              </a:spcAft>
+              <a:buClr>
+                <a:schemeClr val="dk2"/>
+              </a:buClr>
+              <a:buSzPts val="1400"/>
+              <a:buFont typeface="Arial"/>
+              <a:buChar char="■"/>
+              <a:defRPr sz="1400" b="0" i="0" u="none" strike="noStrike" cap="none">
+                <a:solidFill>
+                  <a:schemeClr val="dk2"/>
+                </a:solidFill>
+                <a:latin typeface="Arial"/>
+                <a:ea typeface="Arial"/>
+                <a:cs typeface="Arial"/>
+                <a:sym typeface="Arial"/>
+              </a:defRPr>
+            </a:lvl9pPr>
+          </a:lstStyle>
+          <a:p>
+            <a:pPr marL="114300" indent="0">
+              <a:buNone/>
+            </a:pPr>
+            <a:r>
+              <a:rPr lang="en-US" sz="1400" b="1" dirty="0">
+                <a:solidFill>
+                  <a:schemeClr val="dk1"/>
+                </a:solidFill>
+              </a:rPr>
+              <a:t>Feature Scaling</a:t>
+            </a:r>
+          </a:p>
+        </p:txBody>
+      </p:sp>
+      <p:sp>
+        <p:nvSpPr>
+          <p:cNvPr id="9" name="TextBox 8">
+            <a:extLst>
+              <a:ext uri="{FF2B5EF4-FFF2-40B4-BE49-F238E27FC236}">
+                <a16:creationId xmlns:a16="http://schemas.microsoft.com/office/drawing/2014/main" id="{B4EE2CE7-96C3-2B90-60C4-819168952D3B}"/>
+              </a:ext>
+            </a:extLst>
+          </p:cNvPr>
+          <p:cNvSpPr txBox="1"/>
+          <p:nvPr/>
+        </p:nvSpPr>
+        <p:spPr>
+          <a:xfrm>
+            <a:off x="293410" y="1046019"/>
+            <a:ext cx="8663554" cy="738664"/>
+          </a:xfrm>
+          <a:prstGeom prst="rect">
+            <a:avLst/>
+          </a:prstGeom>
+          <a:noFill/>
+        </p:spPr>
+        <p:txBody>
+          <a:bodyPr wrap="square" rtlCol="0">
+            <a:spAutoFit/>
+          </a:bodyPr>
+          <a:lstStyle/>
+          <a:p>
+            <a:pPr marL="285750" indent="-285750">
+              <a:buFont typeface="Arial" panose="020B0604020202020204" pitchFamily="34" charset="0"/>
+              <a:buChar char="•"/>
+            </a:pPr>
+            <a:r>
+              <a:rPr lang="en-US" dirty="0">
+                <a:latin typeface="Dosis" pitchFamily="2" charset="0"/>
+              </a:rPr>
+              <a:t>After we have all the values in numerical form, we need to transform (scale) the values to ensure fair calculations, especially when we will use distance-based algorithms like K-means clustering.</a:t>
+            </a:r>
+          </a:p>
+          <a:p>
+            <a:pPr marL="285750" indent="-285750">
+              <a:buFont typeface="Arial" panose="020B0604020202020204" pitchFamily="34" charset="0"/>
+              <a:buChar char="•"/>
+            </a:pPr>
+            <a:r>
+              <a:rPr lang="en-US" dirty="0">
+                <a:latin typeface="Dosis" pitchFamily="2" charset="0"/>
+              </a:rPr>
+              <a:t>We use standardization for scaling method to ensure that all columns have mean of 0 and standard deviation of 1.</a:t>
+            </a:r>
+          </a:p>
+        </p:txBody>
+      </p:sp>
+      <p:pic>
+        <p:nvPicPr>
+          <p:cNvPr id="4" name="Picture 3">
+            <a:extLst>
+              <a:ext uri="{FF2B5EF4-FFF2-40B4-BE49-F238E27FC236}">
+                <a16:creationId xmlns:a16="http://schemas.microsoft.com/office/drawing/2014/main" id="{2E8114A8-B231-64DF-CFC7-68805F71FE4A}"/>
+              </a:ext>
+            </a:extLst>
+          </p:cNvPr>
+          <p:cNvPicPr>
+            <a:picLocks noChangeAspect="1"/>
+          </p:cNvPicPr>
+          <p:nvPr/>
+        </p:nvPicPr>
+        <p:blipFill rotWithShape="1">
+          <a:blip r:embed="rId3"/>
+          <a:srcRect b="48283"/>
+          <a:stretch/>
+        </p:blipFill>
+        <p:spPr>
+          <a:xfrm>
+            <a:off x="596241" y="2550305"/>
+            <a:ext cx="1787735" cy="2480801"/>
+          </a:xfrm>
+          <a:prstGeom prst="rect">
+            <a:avLst/>
+          </a:prstGeom>
+        </p:spPr>
+      </p:pic>
+      <p:pic>
+        <p:nvPicPr>
+          <p:cNvPr id="5" name="Picture 4">
+            <a:extLst>
+              <a:ext uri="{FF2B5EF4-FFF2-40B4-BE49-F238E27FC236}">
+                <a16:creationId xmlns:a16="http://schemas.microsoft.com/office/drawing/2014/main" id="{E3B12986-C94B-F54A-9728-E954BF7F31CF}"/>
+              </a:ext>
+            </a:extLst>
+          </p:cNvPr>
+          <p:cNvPicPr>
+            <a:picLocks noChangeAspect="1"/>
+          </p:cNvPicPr>
+          <p:nvPr/>
+        </p:nvPicPr>
+        <p:blipFill rotWithShape="1">
+          <a:blip r:embed="rId3"/>
+          <a:srcRect t="51683"/>
+          <a:stretch/>
+        </p:blipFill>
+        <p:spPr>
+          <a:xfrm>
+            <a:off x="2439396" y="2550305"/>
+            <a:ext cx="1913562" cy="2480801"/>
+          </a:xfrm>
+          <a:prstGeom prst="rect">
+            <a:avLst/>
+          </a:prstGeom>
+        </p:spPr>
+      </p:pic>
+      <p:sp>
+        <p:nvSpPr>
+          <p:cNvPr id="7" name="TextBox 6">
+            <a:extLst>
+              <a:ext uri="{FF2B5EF4-FFF2-40B4-BE49-F238E27FC236}">
+                <a16:creationId xmlns:a16="http://schemas.microsoft.com/office/drawing/2014/main" id="{3CA805ED-1F95-FFC1-530A-93195CBCC88F}"/>
+              </a:ext>
+            </a:extLst>
+          </p:cNvPr>
+          <p:cNvSpPr txBox="1"/>
+          <p:nvPr/>
+        </p:nvSpPr>
+        <p:spPr>
+          <a:xfrm>
+            <a:off x="4408378" y="3586836"/>
+            <a:ext cx="1475509" cy="307777"/>
+          </a:xfrm>
+          <a:prstGeom prst="rect">
+            <a:avLst/>
+          </a:prstGeom>
+          <a:noFill/>
+        </p:spPr>
+        <p:txBody>
+          <a:bodyPr wrap="square">
+            <a:spAutoFit/>
+          </a:bodyPr>
+          <a:lstStyle/>
+          <a:p>
+            <a:r>
+              <a:rPr lang="en-US" b="1" dirty="0">
+                <a:solidFill>
+                  <a:srgbClr val="00B050"/>
+                </a:solidFill>
+              </a:rPr>
+              <a:t>After Scaling</a:t>
+            </a:r>
+            <a:endParaRPr lang="en-ID" b="1" dirty="0">
+              <a:solidFill>
+                <a:srgbClr val="00B050"/>
+              </a:solidFill>
+            </a:endParaRPr>
+          </a:p>
+        </p:txBody>
+      </p:sp>
+      <p:pic>
+        <p:nvPicPr>
+          <p:cNvPr id="11" name="Picture 10">
+            <a:extLst>
+              <a:ext uri="{FF2B5EF4-FFF2-40B4-BE49-F238E27FC236}">
+                <a16:creationId xmlns:a16="http://schemas.microsoft.com/office/drawing/2014/main" id="{7D446572-1545-107C-E0D1-F6D9325BBB61}"/>
+              </a:ext>
+            </a:extLst>
+          </p:cNvPr>
+          <p:cNvPicPr>
+            <a:picLocks noChangeAspect="1"/>
+          </p:cNvPicPr>
+          <p:nvPr/>
+        </p:nvPicPr>
+        <p:blipFill>
+          <a:blip r:embed="rId4"/>
+          <a:stretch>
+            <a:fillRect/>
+          </a:stretch>
+        </p:blipFill>
+        <p:spPr>
+          <a:xfrm>
+            <a:off x="651661" y="1916044"/>
+            <a:ext cx="3575470" cy="511622"/>
+          </a:xfrm>
+          <a:prstGeom prst="rect">
+            <a:avLst/>
+          </a:prstGeom>
+        </p:spPr>
+      </p:pic>
+    </p:spTree>
+    <p:extLst>
+      <p:ext uri="{BB962C8B-B14F-4D97-AF65-F5344CB8AC3E}">
+        <p14:creationId xmlns:p14="http://schemas.microsoft.com/office/powerpoint/2010/main" val="602253494"/>
       </p:ext>
     </p:extLst>
   </p:cSld>

</xml_diff>